<commit_message>
add screenshot of app
</commit_message>
<xml_diff>
--- a/presentation/subreddit_classifier.pptx
+++ b/presentation/subreddit_classifier.pptx
@@ -5,7 +5,7 @@
     <p:sldMasterId id="2147483648" r:id="rId1"/>
   </p:sldMasterIdLst>
   <p:notesMasterIdLst>
-    <p:notesMasterId r:id="rId32"/>
+    <p:notesMasterId r:id="rId33"/>
   </p:notesMasterIdLst>
   <p:sldIdLst>
     <p:sldId id="256" r:id="rId2"/>
@@ -25,19 +25,20 @@
     <p:sldId id="279" r:id="rId16"/>
     <p:sldId id="273" r:id="rId17"/>
     <p:sldId id="274" r:id="rId18"/>
-    <p:sldId id="290" r:id="rId19"/>
-    <p:sldId id="275" r:id="rId20"/>
-    <p:sldId id="276" r:id="rId21"/>
-    <p:sldId id="277" r:id="rId22"/>
-    <p:sldId id="278" r:id="rId23"/>
-    <p:sldId id="282" r:id="rId24"/>
-    <p:sldId id="283" r:id="rId25"/>
-    <p:sldId id="284" r:id="rId26"/>
-    <p:sldId id="285" r:id="rId27"/>
-    <p:sldId id="286" r:id="rId28"/>
-    <p:sldId id="287" r:id="rId29"/>
-    <p:sldId id="288" r:id="rId30"/>
-    <p:sldId id="289" r:id="rId31"/>
+    <p:sldId id="275" r:id="rId19"/>
+    <p:sldId id="291" r:id="rId20"/>
+    <p:sldId id="290" r:id="rId21"/>
+    <p:sldId id="276" r:id="rId22"/>
+    <p:sldId id="277" r:id="rId23"/>
+    <p:sldId id="278" r:id="rId24"/>
+    <p:sldId id="282" r:id="rId25"/>
+    <p:sldId id="283" r:id="rId26"/>
+    <p:sldId id="284" r:id="rId27"/>
+    <p:sldId id="285" r:id="rId28"/>
+    <p:sldId id="286" r:id="rId29"/>
+    <p:sldId id="287" r:id="rId30"/>
+    <p:sldId id="288" r:id="rId31"/>
+    <p:sldId id="289" r:id="rId32"/>
   </p:sldIdLst>
   <p:sldSz cx="12192000" cy="6858000"/>
   <p:notesSz cx="6858000" cy="9144000"/>
@@ -226,7 +227,7 @@
           <a:p>
             <a:fld id="{5D025E36-0042-4A3E-8A11-8EC6AED19BB1}" type="datetimeFigureOut">
               <a:rPr lang="en-SG" smtClean="0"/>
-              <a:t>9/3/2022</a:t>
+              <a:t>10/3/2022</a:t>
             </a:fld>
             <a:endParaRPr lang="en-SG"/>
           </a:p>
@@ -540,7 +541,7 @@
           <a:p>
             <a:r>
               <a:rPr lang="en-SG" dirty="0"/>
-              <a:t>This is a scene from the movie Mr Bean, you see that here, Mr Bean has drawn a crude face on top of a world famous painting.</a:t>
+              <a:t>This is a scene from the movie Mr Bean, you see that here, Mr Bean has drawn a crude but funny face on top of a world famous, and you can say ‘profound’ painting.</a:t>
             </a:r>
           </a:p>
           <a:p>
@@ -549,7 +550,7 @@
           <a:p>
             <a:r>
               <a:rPr lang="en-SG" dirty="0"/>
-              <a:t>I thought it is quite an apt picture to illustrate my presentation, which is titled Profound or Mundane. And for this presentation I would take you through an analysis of profoundness using NLP.</a:t>
+              <a:t>I thought it is quite an apt picture to illustrate my presentation, which is titled Profound or Not profound. And for this presentation I would take you through an analysis of profoundness by classifying subreddits</a:t>
             </a:r>
           </a:p>
           <a:p>
@@ -658,7 +659,7 @@
           <a:p>
             <a:fld id="{599D3639-6417-4491-8B77-DD56E2BC2570}" type="slidenum">
               <a:rPr lang="en-SG" smtClean="0"/>
-              <a:t>24</a:t>
+              <a:t>20</a:t>
             </a:fld>
             <a:endParaRPr lang="en-SG"/>
           </a:p>
@@ -667,7 +668,7 @@
     </p:spTree>
     <p:extLst>
       <p:ext uri="{BB962C8B-B14F-4D97-AF65-F5344CB8AC3E}">
-        <p14:creationId xmlns:p14="http://schemas.microsoft.com/office/powerpoint/2010/main" val="3617716415"/>
+        <p14:creationId xmlns:p14="http://schemas.microsoft.com/office/powerpoint/2010/main" val="4155869275"/>
       </p:ext>
     </p:extLst>
   </p:cSld>
@@ -723,21 +724,7 @@
           <a:p>
             <a:r>
               <a:rPr lang="en-SG" dirty="0"/>
-              <a:t>From looking at the misclassified samples, we see that r/</a:t>
-            </a:r>
-            <a:r>
-              <a:rPr lang="en-SG" dirty="0" err="1"/>
-              <a:t>onelines</a:t>
-            </a:r>
-            <a:r>
-              <a:rPr lang="en-SG" dirty="0"/>
-              <a:t> has some statements which are actually quite profound.</a:t>
-            </a:r>
-          </a:p>
-          <a:p>
-            <a:r>
-              <a:rPr lang="en-SG" dirty="0"/>
-              <a:t>r/quotes have some quotes which may be profound, but not expressed so formally.</a:t>
+              <a:t>Next we move to the second question…</a:t>
             </a:r>
           </a:p>
         </p:txBody>
@@ -759,7 +746,7 @@
           <a:p>
             <a:fld id="{599D3639-6417-4491-8B77-DD56E2BC2570}" type="slidenum">
               <a:rPr lang="en-SG" smtClean="0"/>
-              <a:t>25</a:t>
+              <a:t>21</a:t>
             </a:fld>
             <a:endParaRPr lang="en-SG"/>
           </a:p>
@@ -768,7 +755,7 @@
     </p:spTree>
     <p:extLst>
       <p:ext uri="{BB962C8B-B14F-4D97-AF65-F5344CB8AC3E}">
-        <p14:creationId xmlns:p14="http://schemas.microsoft.com/office/powerpoint/2010/main" val="3962955362"/>
+        <p14:creationId xmlns:p14="http://schemas.microsoft.com/office/powerpoint/2010/main" val="2793129943"/>
       </p:ext>
     </p:extLst>
   </p:cSld>
@@ -822,7 +809,28 @@
           <a:bodyPr/>
           <a:lstStyle/>
           <a:p>
+            <a:r>
+              <a:rPr lang="en-SG" dirty="0"/>
+              <a:t>So I created 128 feature sets. Each containing a different permutation of features. </a:t>
+            </a:r>
+          </a:p>
+          <a:p>
             <a:endParaRPr lang="en-SG" dirty="0"/>
+          </a:p>
+          <a:p>
+            <a:r>
+              <a:rPr lang="en-SG" dirty="0"/>
+              <a:t>By passing different combinations of our dataset through a classifier. </a:t>
+            </a:r>
+          </a:p>
+          <a:p>
+            <a:endParaRPr lang="en-SG" dirty="0"/>
+          </a:p>
+          <a:p>
+            <a:r>
+              <a:rPr lang="en-SG" dirty="0"/>
+              <a:t>We see that the best feature is feature set 106, but in the end, selected feature set 33, which uses 2 less features. </a:t>
+            </a:r>
           </a:p>
         </p:txBody>
       </p:sp>
@@ -843,7 +851,295 @@
           <a:p>
             <a:fld id="{599D3639-6417-4491-8B77-DD56E2BC2570}" type="slidenum">
               <a:rPr lang="en-SG" smtClean="0"/>
-              <a:t>28</a:t>
+              <a:t>22</a:t>
+            </a:fld>
+            <a:endParaRPr lang="en-SG"/>
+          </a:p>
+        </p:txBody>
+      </p:sp>
+    </p:spTree>
+    <p:extLst>
+      <p:ext uri="{BB962C8B-B14F-4D97-AF65-F5344CB8AC3E}">
+        <p14:creationId xmlns:p14="http://schemas.microsoft.com/office/powerpoint/2010/main" val="3074344153"/>
+      </p:ext>
+    </p:extLst>
+  </p:cSld>
+  <p:clrMapOvr>
+    <a:masterClrMapping/>
+  </p:clrMapOvr>
+</p:notes>
+</file>
+
+<file path=ppt/notesSlides/notesSlide13.xml><?xml version="1.0" encoding="utf-8"?>
+<p:notes xmlns:a="http://schemas.openxmlformats.org/drawingml/2006/main" xmlns:r="http://schemas.openxmlformats.org/officeDocument/2006/relationships" xmlns:p="http://schemas.openxmlformats.org/presentationml/2006/main">
+  <p:cSld>
+    <p:spTree>
+      <p:nvGrpSpPr>
+        <p:cNvPr id="1" name=""/>
+        <p:cNvGrpSpPr/>
+        <p:nvPr/>
+      </p:nvGrpSpPr>
+      <p:grpSpPr>
+        <a:xfrm>
+          <a:off x="0" y="0"/>
+          <a:ext cx="0" cy="0"/>
+          <a:chOff x="0" y="0"/>
+          <a:chExt cx="0" cy="0"/>
+        </a:xfrm>
+      </p:grpSpPr>
+      <p:sp>
+        <p:nvSpPr>
+          <p:cNvPr id="2" name="Slide Image Placeholder 1"/>
+          <p:cNvSpPr>
+            <a:spLocks noGrp="1" noRot="1" noChangeAspect="1"/>
+          </p:cNvSpPr>
+          <p:nvPr>
+            <p:ph type="sldImg"/>
+          </p:nvPr>
+        </p:nvSpPr>
+        <p:spPr/>
+      </p:sp>
+      <p:sp>
+        <p:nvSpPr>
+          <p:cNvPr id="3" name="Notes Placeholder 2"/>
+          <p:cNvSpPr>
+            <a:spLocks noGrp="1"/>
+          </p:cNvSpPr>
+          <p:nvPr>
+            <p:ph type="body" idx="1"/>
+          </p:nvPr>
+        </p:nvSpPr>
+        <p:spPr/>
+        <p:txBody>
+          <a:bodyPr/>
+          <a:lstStyle/>
+          <a:p>
+            <a:r>
+              <a:rPr lang="en-SG" dirty="0"/>
+              <a:t>When we analyse the individual misclassification rate of the subreddits, we see that r/</a:t>
+            </a:r>
+            <a:r>
+              <a:rPr lang="en-SG" dirty="0" err="1"/>
+              <a:t>oneliners</a:t>
+            </a:r>
+            <a:r>
+              <a:rPr lang="en-SG" dirty="0"/>
+              <a:t> has a higher misclassification rate. This could be due to more of the quotes in r/</a:t>
+            </a:r>
+            <a:r>
+              <a:rPr lang="en-SG" dirty="0" err="1"/>
+              <a:t>oneliners</a:t>
+            </a:r>
+            <a:r>
+              <a:rPr lang="en-SG" dirty="0"/>
+              <a:t> being profound as well.</a:t>
+            </a:r>
+          </a:p>
+        </p:txBody>
+      </p:sp>
+      <p:sp>
+        <p:nvSpPr>
+          <p:cNvPr id="4" name="Slide Number Placeholder 3"/>
+          <p:cNvSpPr>
+            <a:spLocks noGrp="1"/>
+          </p:cNvSpPr>
+          <p:nvPr>
+            <p:ph type="sldNum" sz="quarter" idx="5"/>
+          </p:nvPr>
+        </p:nvSpPr>
+        <p:spPr/>
+        <p:txBody>
+          <a:bodyPr/>
+          <a:lstStyle/>
+          <a:p>
+            <a:fld id="{599D3639-6417-4491-8B77-DD56E2BC2570}" type="slidenum">
+              <a:rPr lang="en-SG" smtClean="0"/>
+              <a:t>25</a:t>
+            </a:fld>
+            <a:endParaRPr lang="en-SG"/>
+          </a:p>
+        </p:txBody>
+      </p:sp>
+    </p:spTree>
+    <p:extLst>
+      <p:ext uri="{BB962C8B-B14F-4D97-AF65-F5344CB8AC3E}">
+        <p14:creationId xmlns:p14="http://schemas.microsoft.com/office/powerpoint/2010/main" val="3617716415"/>
+      </p:ext>
+    </p:extLst>
+  </p:cSld>
+  <p:clrMapOvr>
+    <a:masterClrMapping/>
+  </p:clrMapOvr>
+</p:notes>
+</file>
+
+<file path=ppt/notesSlides/notesSlide14.xml><?xml version="1.0" encoding="utf-8"?>
+<p:notes xmlns:a="http://schemas.openxmlformats.org/drawingml/2006/main" xmlns:r="http://schemas.openxmlformats.org/officeDocument/2006/relationships" xmlns:p="http://schemas.openxmlformats.org/presentationml/2006/main">
+  <p:cSld>
+    <p:spTree>
+      <p:nvGrpSpPr>
+        <p:cNvPr id="1" name=""/>
+        <p:cNvGrpSpPr/>
+        <p:nvPr/>
+      </p:nvGrpSpPr>
+      <p:grpSpPr>
+        <a:xfrm>
+          <a:off x="0" y="0"/>
+          <a:ext cx="0" cy="0"/>
+          <a:chOff x="0" y="0"/>
+          <a:chExt cx="0" cy="0"/>
+        </a:xfrm>
+      </p:grpSpPr>
+      <p:sp>
+        <p:nvSpPr>
+          <p:cNvPr id="2" name="Slide Image Placeholder 1"/>
+          <p:cNvSpPr>
+            <a:spLocks noGrp="1" noRot="1" noChangeAspect="1"/>
+          </p:cNvSpPr>
+          <p:nvPr>
+            <p:ph type="sldImg"/>
+          </p:nvPr>
+        </p:nvSpPr>
+        <p:spPr/>
+      </p:sp>
+      <p:sp>
+        <p:nvSpPr>
+          <p:cNvPr id="3" name="Notes Placeholder 2"/>
+          <p:cNvSpPr>
+            <a:spLocks noGrp="1"/>
+          </p:cNvSpPr>
+          <p:nvPr>
+            <p:ph type="body" idx="1"/>
+          </p:nvPr>
+        </p:nvSpPr>
+        <p:spPr/>
+        <p:txBody>
+          <a:bodyPr/>
+          <a:lstStyle/>
+          <a:p>
+            <a:r>
+              <a:rPr lang="en-SG" dirty="0"/>
+              <a:t>From looking at the misclassified samples, we see that r/</a:t>
+            </a:r>
+            <a:r>
+              <a:rPr lang="en-SG" dirty="0" err="1"/>
+              <a:t>onelines</a:t>
+            </a:r>
+            <a:r>
+              <a:rPr lang="en-SG" dirty="0"/>
+              <a:t> has some statements which are actually quite profound.</a:t>
+            </a:r>
+          </a:p>
+          <a:p>
+            <a:r>
+              <a:rPr lang="en-SG" dirty="0"/>
+              <a:t>r/quotes have some quotes which may be profound, but not expressed so formally.</a:t>
+            </a:r>
+          </a:p>
+        </p:txBody>
+      </p:sp>
+      <p:sp>
+        <p:nvSpPr>
+          <p:cNvPr id="4" name="Slide Number Placeholder 3"/>
+          <p:cNvSpPr>
+            <a:spLocks noGrp="1"/>
+          </p:cNvSpPr>
+          <p:nvPr>
+            <p:ph type="sldNum" sz="quarter" idx="5"/>
+          </p:nvPr>
+        </p:nvSpPr>
+        <p:spPr/>
+        <p:txBody>
+          <a:bodyPr/>
+          <a:lstStyle/>
+          <a:p>
+            <a:fld id="{599D3639-6417-4491-8B77-DD56E2BC2570}" type="slidenum">
+              <a:rPr lang="en-SG" smtClean="0"/>
+              <a:t>26</a:t>
+            </a:fld>
+            <a:endParaRPr lang="en-SG"/>
+          </a:p>
+        </p:txBody>
+      </p:sp>
+    </p:spTree>
+    <p:extLst>
+      <p:ext uri="{BB962C8B-B14F-4D97-AF65-F5344CB8AC3E}">
+        <p14:creationId xmlns:p14="http://schemas.microsoft.com/office/powerpoint/2010/main" val="3962955362"/>
+      </p:ext>
+    </p:extLst>
+  </p:cSld>
+  <p:clrMapOvr>
+    <a:masterClrMapping/>
+  </p:clrMapOvr>
+</p:notes>
+</file>
+
+<file path=ppt/notesSlides/notesSlide15.xml><?xml version="1.0" encoding="utf-8"?>
+<p:notes xmlns:a="http://schemas.openxmlformats.org/drawingml/2006/main" xmlns:r="http://schemas.openxmlformats.org/officeDocument/2006/relationships" xmlns:p="http://schemas.openxmlformats.org/presentationml/2006/main">
+  <p:cSld>
+    <p:spTree>
+      <p:nvGrpSpPr>
+        <p:cNvPr id="1" name=""/>
+        <p:cNvGrpSpPr/>
+        <p:nvPr/>
+      </p:nvGrpSpPr>
+      <p:grpSpPr>
+        <a:xfrm>
+          <a:off x="0" y="0"/>
+          <a:ext cx="0" cy="0"/>
+          <a:chOff x="0" y="0"/>
+          <a:chExt cx="0" cy="0"/>
+        </a:xfrm>
+      </p:grpSpPr>
+      <p:sp>
+        <p:nvSpPr>
+          <p:cNvPr id="2" name="Slide Image Placeholder 1"/>
+          <p:cNvSpPr>
+            <a:spLocks noGrp="1" noRot="1" noChangeAspect="1"/>
+          </p:cNvSpPr>
+          <p:nvPr>
+            <p:ph type="sldImg"/>
+          </p:nvPr>
+        </p:nvSpPr>
+        <p:spPr/>
+      </p:sp>
+      <p:sp>
+        <p:nvSpPr>
+          <p:cNvPr id="3" name="Notes Placeholder 2"/>
+          <p:cNvSpPr>
+            <a:spLocks noGrp="1"/>
+          </p:cNvSpPr>
+          <p:nvPr>
+            <p:ph type="body" idx="1"/>
+          </p:nvPr>
+        </p:nvSpPr>
+        <p:spPr/>
+        <p:txBody>
+          <a:bodyPr/>
+          <a:lstStyle/>
+          <a:p>
+            <a:endParaRPr lang="en-SG" dirty="0"/>
+          </a:p>
+        </p:txBody>
+      </p:sp>
+      <p:sp>
+        <p:nvSpPr>
+          <p:cNvPr id="4" name="Slide Number Placeholder 3"/>
+          <p:cNvSpPr>
+            <a:spLocks noGrp="1"/>
+          </p:cNvSpPr>
+          <p:nvPr>
+            <p:ph type="sldNum" sz="quarter" idx="5"/>
+          </p:nvPr>
+        </p:nvSpPr>
+        <p:spPr/>
+        <p:txBody>
+          <a:bodyPr/>
+          <a:lstStyle/>
+          <a:p>
+            <a:fld id="{599D3639-6417-4491-8B77-DD56E2BC2570}" type="slidenum">
+              <a:rPr lang="en-SG" smtClean="0"/>
+              <a:t>29</a:t>
             </a:fld>
             <a:endParaRPr lang="en-SG"/>
           </a:p>
@@ -1104,7 +1400,7 @@
             </a:pPr>
             <a:r>
               <a:rPr lang="en-SG" dirty="0"/>
-              <a:t>To answer the first question, is there a pattern to profound sentence. </a:t>
+              <a:t>To answer the first question, is there a pattern to profound sentence.  Let us look at some of the features. It is quite interesting that when you compare the common words from both subreddits, some words from r/quotes stood out. </a:t>
             </a:r>
           </a:p>
         </p:txBody>
@@ -1468,7 +1764,7 @@
           <a:p>
             <a:r>
               <a:rPr lang="en-SG" dirty="0"/>
-              <a:t>Next we move to the second question…</a:t>
+              <a:t>Grouped according to the frequency of tag in each subreddit</a:t>
             </a:r>
           </a:p>
         </p:txBody>
@@ -1490,7 +1786,7 @@
           <a:p>
             <a:fld id="{599D3639-6417-4491-8B77-DD56E2BC2570}" type="slidenum">
               <a:rPr lang="en-SG" smtClean="0"/>
-              <a:t>20</a:t>
+              <a:t>17</a:t>
             </a:fld>
             <a:endParaRPr lang="en-SG"/>
           </a:p>
@@ -1499,7 +1795,7 @@
     </p:spTree>
     <p:extLst>
       <p:ext uri="{BB962C8B-B14F-4D97-AF65-F5344CB8AC3E}">
-        <p14:creationId xmlns:p14="http://schemas.microsoft.com/office/powerpoint/2010/main" val="2793129943"/>
+        <p14:creationId xmlns:p14="http://schemas.microsoft.com/office/powerpoint/2010/main" val="1205349852"/>
       </p:ext>
     </p:extLst>
   </p:cSld>
@@ -1553,28 +1849,7 @@
           <a:bodyPr/>
           <a:lstStyle/>
           <a:p>
-            <a:r>
-              <a:rPr lang="en-SG" dirty="0"/>
-              <a:t>So here you see different combinations of feature. </a:t>
-            </a:r>
-          </a:p>
-          <a:p>
             <a:endParaRPr lang="en-SG" dirty="0"/>
-          </a:p>
-          <a:p>
-            <a:r>
-              <a:rPr lang="en-SG" dirty="0"/>
-              <a:t>By passing different combinations of our dataset through a rather fast algorithm, in this case, the logistics regression. </a:t>
-            </a:r>
-          </a:p>
-          <a:p>
-            <a:endParaRPr lang="en-SG" dirty="0"/>
-          </a:p>
-          <a:p>
-            <a:r>
-              <a:rPr lang="en-SG" dirty="0"/>
-              <a:t>We see that the best feature is feature set 106, but in the end, selected feature set 33, which uses 2 less features. And by looking at the effect when the selected features added individually, we see that these selected features are the ones which increased accuracy rather significantly.</a:t>
-            </a:r>
           </a:p>
         </p:txBody>
       </p:sp>
@@ -1595,7 +1870,7 @@
           <a:p>
             <a:fld id="{599D3639-6417-4491-8B77-DD56E2BC2570}" type="slidenum">
               <a:rPr lang="en-SG" smtClean="0"/>
-              <a:t>21</a:t>
+              <a:t>19</a:t>
             </a:fld>
             <a:endParaRPr lang="en-SG"/>
           </a:p>
@@ -1604,7 +1879,7 @@
     </p:spTree>
     <p:extLst>
       <p:ext uri="{BB962C8B-B14F-4D97-AF65-F5344CB8AC3E}">
-        <p14:creationId xmlns:p14="http://schemas.microsoft.com/office/powerpoint/2010/main" val="3074344153"/>
+        <p14:creationId xmlns:p14="http://schemas.microsoft.com/office/powerpoint/2010/main" val="282226566"/>
       </p:ext>
     </p:extLst>
   </p:cSld>
@@ -1763,7 +2038,7 @@
           <a:p>
             <a:fld id="{801E2BF2-5CCC-4DD0-A0A4-F925FD3FFCC2}" type="datetimeFigureOut">
               <a:rPr lang="en-SG" smtClean="0"/>
-              <a:t>9/3/2022</a:t>
+              <a:t>10/3/2022</a:t>
             </a:fld>
             <a:endParaRPr lang="en-SG"/>
           </a:p>
@@ -1963,7 +2238,7 @@
           <a:p>
             <a:fld id="{801E2BF2-5CCC-4DD0-A0A4-F925FD3FFCC2}" type="datetimeFigureOut">
               <a:rPr lang="en-SG" smtClean="0"/>
-              <a:t>9/3/2022</a:t>
+              <a:t>10/3/2022</a:t>
             </a:fld>
             <a:endParaRPr lang="en-SG"/>
           </a:p>
@@ -2173,7 +2448,7 @@
           <a:p>
             <a:fld id="{801E2BF2-5CCC-4DD0-A0A4-F925FD3FFCC2}" type="datetimeFigureOut">
               <a:rPr lang="en-SG" smtClean="0"/>
-              <a:t>9/3/2022</a:t>
+              <a:t>10/3/2022</a:t>
             </a:fld>
             <a:endParaRPr lang="en-SG"/>
           </a:p>
@@ -2373,7 +2648,7 @@
           <a:p>
             <a:fld id="{801E2BF2-5CCC-4DD0-A0A4-F925FD3FFCC2}" type="datetimeFigureOut">
               <a:rPr lang="en-SG" smtClean="0"/>
-              <a:t>9/3/2022</a:t>
+              <a:t>10/3/2022</a:t>
             </a:fld>
             <a:endParaRPr lang="en-SG"/>
           </a:p>
@@ -2649,7 +2924,7 @@
           <a:p>
             <a:fld id="{801E2BF2-5CCC-4DD0-A0A4-F925FD3FFCC2}" type="datetimeFigureOut">
               <a:rPr lang="en-SG" smtClean="0"/>
-              <a:t>9/3/2022</a:t>
+              <a:t>10/3/2022</a:t>
             </a:fld>
             <a:endParaRPr lang="en-SG"/>
           </a:p>
@@ -2917,7 +3192,7 @@
           <a:p>
             <a:fld id="{801E2BF2-5CCC-4DD0-A0A4-F925FD3FFCC2}" type="datetimeFigureOut">
               <a:rPr lang="en-SG" smtClean="0"/>
-              <a:t>9/3/2022</a:t>
+              <a:t>10/3/2022</a:t>
             </a:fld>
             <a:endParaRPr lang="en-SG"/>
           </a:p>
@@ -3332,7 +3607,7 @@
           <a:p>
             <a:fld id="{801E2BF2-5CCC-4DD0-A0A4-F925FD3FFCC2}" type="datetimeFigureOut">
               <a:rPr lang="en-SG" smtClean="0"/>
-              <a:t>9/3/2022</a:t>
+              <a:t>10/3/2022</a:t>
             </a:fld>
             <a:endParaRPr lang="en-SG"/>
           </a:p>
@@ -3474,7 +3749,7 @@
           <a:p>
             <a:fld id="{801E2BF2-5CCC-4DD0-A0A4-F925FD3FFCC2}" type="datetimeFigureOut">
               <a:rPr lang="en-SG" smtClean="0"/>
-              <a:t>9/3/2022</a:t>
+              <a:t>10/3/2022</a:t>
             </a:fld>
             <a:endParaRPr lang="en-SG"/>
           </a:p>
@@ -3587,7 +3862,7 @@
           <a:p>
             <a:fld id="{801E2BF2-5CCC-4DD0-A0A4-F925FD3FFCC2}" type="datetimeFigureOut">
               <a:rPr lang="en-SG" smtClean="0"/>
-              <a:t>9/3/2022</a:t>
+              <a:t>10/3/2022</a:t>
             </a:fld>
             <a:endParaRPr lang="en-SG"/>
           </a:p>
@@ -3900,7 +4175,7 @@
           <a:p>
             <a:fld id="{801E2BF2-5CCC-4DD0-A0A4-F925FD3FFCC2}" type="datetimeFigureOut">
               <a:rPr lang="en-SG" smtClean="0"/>
-              <a:t>9/3/2022</a:t>
+              <a:t>10/3/2022</a:t>
             </a:fld>
             <a:endParaRPr lang="en-SG"/>
           </a:p>
@@ -4189,7 +4464,7 @@
           <a:p>
             <a:fld id="{801E2BF2-5CCC-4DD0-A0A4-F925FD3FFCC2}" type="datetimeFigureOut">
               <a:rPr lang="en-SG" smtClean="0"/>
-              <a:t>9/3/2022</a:t>
+              <a:t>10/3/2022</a:t>
             </a:fld>
             <a:endParaRPr lang="en-SG"/>
           </a:p>
@@ -4432,7 +4707,7 @@
           <a:p>
             <a:fld id="{801E2BF2-5CCC-4DD0-A0A4-F925FD3FFCC2}" type="datetimeFigureOut">
               <a:rPr lang="en-SG" smtClean="0"/>
-              <a:t>9/3/2022</a:t>
+              <a:t>10/3/2022</a:t>
             </a:fld>
             <a:endParaRPr lang="en-SG"/>
           </a:p>
@@ -4912,8 +5187,8 @@
         </p:nvSpPr>
         <p:spPr>
           <a:xfrm>
-            <a:off x="402136" y="5438804"/>
-            <a:ext cx="5922464" cy="790422"/>
+            <a:off x="402135" y="5438804"/>
+            <a:ext cx="6717855" cy="790422"/>
           </a:xfrm>
           <a:ln>
             <a:noFill/>
@@ -4921,7 +5196,7 @@
         </p:spPr>
         <p:txBody>
           <a:bodyPr>
-            <a:normAutofit/>
+            <a:normAutofit fontScale="90000"/>
           </a:bodyPr>
           <a:lstStyle/>
           <a:p>
@@ -4965,7 +5240,7 @@
                 <a:latin typeface="MV Boli" panose="02000500030200090000" pitchFamily="2" charset="0"/>
                 <a:cs typeface="MV Boli" panose="02000500030200090000" pitchFamily="2" charset="0"/>
               </a:rPr>
-              <a:t>Mundane</a:t>
+              <a:t>Not Profound</a:t>
             </a:r>
             <a:r>
               <a:rPr lang="en-SG" sz="4200" b="1" dirty="0">
@@ -4996,7 +5271,7 @@
         <p:spPr>
           <a:xfrm>
             <a:off x="689375" y="6229226"/>
-            <a:ext cx="6343159" cy="552574"/>
+            <a:ext cx="7632692" cy="552574"/>
           </a:xfrm>
         </p:spPr>
         <p:txBody>
@@ -5008,7 +5283,7 @@
             <a:pPr algn="l"/>
             <a:r>
               <a:rPr lang="en-SG" b="1" dirty="0"/>
-              <a:t>Analysing profoundness through NLP</a:t>
+              <a:t>Analysing profoundness through classifying subreddits.</a:t>
             </a:r>
             <a:endParaRPr lang="en-SG" sz="2400" b="1" dirty="0"/>
           </a:p>
@@ -7391,7 +7666,7 @@
           <p:nvPr/>
         </p:nvPicPr>
         <p:blipFill>
-          <a:blip r:embed="rId2">
+          <a:blip r:embed="rId3">
             <a:extLst>
               <a:ext uri="{28A0092B-C50C-407E-A947-70E740481C1C}">
                 <a14:useLocalDpi xmlns:a14="http://schemas.microsoft.com/office/drawing/2010/main" val="0"/>
@@ -7507,7 +7782,7 @@
 </file>
 
 <file path=ppt/slides/slide18.xml><?xml version="1.0" encoding="utf-8"?>
-<p:sld xmlns:a="http://schemas.openxmlformats.org/drawingml/2006/main" xmlns:r="http://schemas.openxmlformats.org/officeDocument/2006/relationships" xmlns:p="http://schemas.openxmlformats.org/presentationml/2006/main">
+<p:sld xmlns:a="http://schemas.openxmlformats.org/drawingml/2006/main" xmlns:r="http://schemas.openxmlformats.org/officeDocument/2006/relationships" xmlns:p="http://schemas.openxmlformats.org/presentationml/2006/main" show="0">
   <p:cSld>
     <p:spTree>
       <p:nvGrpSpPr>
@@ -7614,7 +7889,7 @@
         </p:spPr>
         <p:txBody>
           <a:bodyPr>
-            <a:normAutofit/>
+            <a:normAutofit fontScale="92500" lnSpcReduction="10000"/>
           </a:bodyPr>
           <a:lstStyle/>
           <a:p>
@@ -7636,6 +7911,72 @@
                 <a:latin typeface="Franklin Gothic Book" panose="020B0503020102020204" pitchFamily="34" charset="0"/>
               </a:rPr>
               <a:t>less “formal”</a:t>
+            </a:r>
+          </a:p>
+          <a:p>
+            <a:pPr algn="just"/>
+            <a:r>
+              <a:rPr lang="en-SG" b="1" dirty="0">
+                <a:solidFill>
+                  <a:srgbClr val="623C4E"/>
+                </a:solidFill>
+                <a:latin typeface="Franklin Gothic Book" panose="020B0503020102020204" pitchFamily="34" charset="0"/>
+              </a:rPr>
+              <a:t>symbols(i.e. :,!) , numerals(i.e. 1,2,3), proper nouns (i.e. Escobar, Liverpool), as well as verbs with a time setting, such as past tense (i.e. </a:t>
+            </a:r>
+            <a:r>
+              <a:rPr lang="en-SG" b="1" i="1" dirty="0">
+                <a:solidFill>
+                  <a:srgbClr val="623C4E"/>
+                </a:solidFill>
+                <a:latin typeface="Franklin Gothic Book" panose="020B0503020102020204" pitchFamily="34" charset="0"/>
+              </a:rPr>
+              <a:t>made</a:t>
+            </a:r>
+            <a:r>
+              <a:rPr lang="en-SG" b="1" dirty="0">
+                <a:solidFill>
+                  <a:srgbClr val="623C4E"/>
+                </a:solidFill>
+                <a:latin typeface="Franklin Gothic Book" panose="020B0503020102020204" pitchFamily="34" charset="0"/>
+              </a:rPr>
+              <a:t>), and present participle (i.e. </a:t>
+            </a:r>
+            <a:r>
+              <a:rPr lang="en-SG" b="1" i="1" dirty="0">
+                <a:solidFill>
+                  <a:srgbClr val="623C4E"/>
+                </a:solidFill>
+                <a:latin typeface="Franklin Gothic Book" panose="020B0503020102020204" pitchFamily="34" charset="0"/>
+              </a:rPr>
+              <a:t>making</a:t>
+            </a:r>
+            <a:r>
+              <a:rPr lang="en-SG" b="1" dirty="0">
+                <a:solidFill>
+                  <a:srgbClr val="623C4E"/>
+                </a:solidFill>
+                <a:latin typeface="Franklin Gothic Book" panose="020B0503020102020204" pitchFamily="34" charset="0"/>
+              </a:rPr>
+              <a:t>) , as well as interjection like (i.e. </a:t>
+            </a:r>
+            <a:r>
+              <a:rPr lang="en-SG" b="1" i="1" dirty="0">
+                <a:solidFill>
+                  <a:srgbClr val="623C4E"/>
+                </a:solidFill>
+                <a:latin typeface="Franklin Gothic Book" panose="020B0503020102020204" pitchFamily="34" charset="0"/>
+              </a:rPr>
+              <a:t>oops, huh</a:t>
+            </a:r>
+            <a:r>
+              <a:rPr lang="en-SG" b="1" dirty="0">
+                <a:solidFill>
+                  <a:srgbClr val="623C4E"/>
+                </a:solidFill>
+                <a:latin typeface="Franklin Gothic Book" panose="020B0503020102020204" pitchFamily="34" charset="0"/>
+              </a:rPr>
+              <a:t>)</a:t>
             </a:r>
           </a:p>
         </p:txBody>
@@ -7857,6 +8198,72 @@
               </a:solidFill>
               <a:latin typeface="Franklin Gothic Book" panose="020B0503020102020204" pitchFamily="34" charset="0"/>
             </a:endParaRPr>
+          </a:p>
+          <a:p>
+            <a:pPr algn="just"/>
+            <a:r>
+              <a:rPr lang="en-SG" b="1" dirty="0">
+                <a:solidFill>
+                  <a:srgbClr val="1C5A57"/>
+                </a:solidFill>
+                <a:latin typeface="Franklin Gothic Book" panose="020B0503020102020204" pitchFamily="34" charset="0"/>
+              </a:rPr>
+              <a:t>such as pronoun(i.e. </a:t>
+            </a:r>
+            <a:r>
+              <a:rPr lang="en-SG" b="1" i="1" dirty="0">
+                <a:solidFill>
+                  <a:srgbClr val="1C5A57"/>
+                </a:solidFill>
+                <a:latin typeface="Franklin Gothic Book" panose="020B0503020102020204" pitchFamily="34" charset="0"/>
+              </a:rPr>
+              <a:t>whose, whom</a:t>
+            </a:r>
+            <a:r>
+              <a:rPr lang="en-SG" b="1" dirty="0">
+                <a:solidFill>
+                  <a:srgbClr val="1C5A57"/>
+                </a:solidFill>
+                <a:latin typeface="Franklin Gothic Book" panose="020B0503020102020204" pitchFamily="34" charset="0"/>
+              </a:rPr>
+              <a:t>), conjunction(i.e. </a:t>
+            </a:r>
+            <a:r>
+              <a:rPr lang="en-SG" b="1" i="1" dirty="0">
+                <a:solidFill>
+                  <a:srgbClr val="1C5A57"/>
+                </a:solidFill>
+                <a:latin typeface="Franklin Gothic Book" panose="020B0503020102020204" pitchFamily="34" charset="0"/>
+              </a:rPr>
+              <a:t>and, nor</a:t>
+            </a:r>
+            <a:r>
+              <a:rPr lang="en-SG" b="1" dirty="0">
+                <a:solidFill>
+                  <a:srgbClr val="1C5A57"/>
+                </a:solidFill>
+                <a:latin typeface="Franklin Gothic Book" panose="020B0503020102020204" pitchFamily="34" charset="0"/>
+              </a:rPr>
+              <a:t>), and comparative adjective(i.e. </a:t>
+            </a:r>
+            <a:r>
+              <a:rPr lang="en-SG" b="1" i="1" dirty="0">
+                <a:solidFill>
+                  <a:srgbClr val="1C5A57"/>
+                </a:solidFill>
+                <a:latin typeface="Franklin Gothic Book" panose="020B0503020102020204" pitchFamily="34" charset="0"/>
+              </a:rPr>
+              <a:t>best, bleaker</a:t>
+            </a:r>
+            <a:r>
+              <a:rPr lang="en-SG" b="1" dirty="0">
+                <a:solidFill>
+                  <a:srgbClr val="1C5A57"/>
+                </a:solidFill>
+                <a:latin typeface="Franklin Gothic Book" panose="020B0503020102020204" pitchFamily="34" charset="0"/>
+              </a:rPr>
+              <a:t>) </a:t>
+            </a:r>
           </a:p>
         </p:txBody>
       </p:sp>
@@ -8096,7 +8503,7 @@
     </p:spTree>
     <p:extLst>
       <p:ext uri="{BB962C8B-B14F-4D97-AF65-F5344CB8AC3E}">
-        <p14:creationId xmlns:p14="http://schemas.microsoft.com/office/powerpoint/2010/main" val="469708960"/>
+        <p14:creationId xmlns:p14="http://schemas.microsoft.com/office/powerpoint/2010/main" val="4140363535"/>
       </p:ext>
     </p:extLst>
   </p:cSld>
@@ -8217,7 +8624,7 @@
         </p:spPr>
         <p:txBody>
           <a:bodyPr>
-            <a:normAutofit fontScale="92500" lnSpcReduction="10000"/>
+            <a:normAutofit/>
           </a:bodyPr>
           <a:lstStyle/>
           <a:p>
@@ -8239,72 +8646,6 @@
                 <a:latin typeface="Franklin Gothic Book" panose="020B0503020102020204" pitchFamily="34" charset="0"/>
               </a:rPr>
               <a:t>less “formal”</a:t>
-            </a:r>
-          </a:p>
-          <a:p>
-            <a:pPr algn="just"/>
-            <a:r>
-              <a:rPr lang="en-SG" b="1" dirty="0">
-                <a:solidFill>
-                  <a:srgbClr val="623C4E"/>
-                </a:solidFill>
-                <a:latin typeface="Franklin Gothic Book" panose="020B0503020102020204" pitchFamily="34" charset="0"/>
-              </a:rPr>
-              <a:t>symbols(i.e. :,!) , numerals(i.e. 1,2,3), proper nouns (i.e. Escobar, Liverpool), as well as verbs with a time setting, such as past tense (i.e. </a:t>
-            </a:r>
-            <a:r>
-              <a:rPr lang="en-SG" b="1" i="1" dirty="0">
-                <a:solidFill>
-                  <a:srgbClr val="623C4E"/>
-                </a:solidFill>
-                <a:latin typeface="Franklin Gothic Book" panose="020B0503020102020204" pitchFamily="34" charset="0"/>
-              </a:rPr>
-              <a:t>made</a:t>
-            </a:r>
-            <a:r>
-              <a:rPr lang="en-SG" b="1" dirty="0">
-                <a:solidFill>
-                  <a:srgbClr val="623C4E"/>
-                </a:solidFill>
-                <a:latin typeface="Franklin Gothic Book" panose="020B0503020102020204" pitchFamily="34" charset="0"/>
-              </a:rPr>
-              <a:t>), and present participle (i.e. </a:t>
-            </a:r>
-            <a:r>
-              <a:rPr lang="en-SG" b="1" i="1" dirty="0">
-                <a:solidFill>
-                  <a:srgbClr val="623C4E"/>
-                </a:solidFill>
-                <a:latin typeface="Franklin Gothic Book" panose="020B0503020102020204" pitchFamily="34" charset="0"/>
-              </a:rPr>
-              <a:t>making</a:t>
-            </a:r>
-            <a:r>
-              <a:rPr lang="en-SG" b="1" dirty="0">
-                <a:solidFill>
-                  <a:srgbClr val="623C4E"/>
-                </a:solidFill>
-                <a:latin typeface="Franklin Gothic Book" panose="020B0503020102020204" pitchFamily="34" charset="0"/>
-              </a:rPr>
-              <a:t>) , as well as interjection like (i.e. </a:t>
-            </a:r>
-            <a:r>
-              <a:rPr lang="en-SG" b="1" i="1" dirty="0">
-                <a:solidFill>
-                  <a:srgbClr val="623C4E"/>
-                </a:solidFill>
-                <a:latin typeface="Franklin Gothic Book" panose="020B0503020102020204" pitchFamily="34" charset="0"/>
-              </a:rPr>
-              <a:t>oops, huh</a:t>
-            </a:r>
-            <a:r>
-              <a:rPr lang="en-SG" b="1" dirty="0">
-                <a:solidFill>
-                  <a:srgbClr val="623C4E"/>
-                </a:solidFill>
-                <a:latin typeface="Franklin Gothic Book" panose="020B0503020102020204" pitchFamily="34" charset="0"/>
-              </a:rPr>
-              <a:t>)</a:t>
             </a:r>
           </a:p>
         </p:txBody>
@@ -8526,72 +8867,6 @@
               </a:solidFill>
               <a:latin typeface="Franklin Gothic Book" panose="020B0503020102020204" pitchFamily="34" charset="0"/>
             </a:endParaRPr>
-          </a:p>
-          <a:p>
-            <a:pPr algn="just"/>
-            <a:r>
-              <a:rPr lang="en-SG" b="1" dirty="0">
-                <a:solidFill>
-                  <a:srgbClr val="1C5A57"/>
-                </a:solidFill>
-                <a:latin typeface="Franklin Gothic Book" panose="020B0503020102020204" pitchFamily="34" charset="0"/>
-              </a:rPr>
-              <a:t>such as pronoun(i.e. </a:t>
-            </a:r>
-            <a:r>
-              <a:rPr lang="en-SG" b="1" i="1" dirty="0">
-                <a:solidFill>
-                  <a:srgbClr val="1C5A57"/>
-                </a:solidFill>
-                <a:latin typeface="Franklin Gothic Book" panose="020B0503020102020204" pitchFamily="34" charset="0"/>
-              </a:rPr>
-              <a:t>whose, whom</a:t>
-            </a:r>
-            <a:r>
-              <a:rPr lang="en-SG" b="1" dirty="0">
-                <a:solidFill>
-                  <a:srgbClr val="1C5A57"/>
-                </a:solidFill>
-                <a:latin typeface="Franklin Gothic Book" panose="020B0503020102020204" pitchFamily="34" charset="0"/>
-              </a:rPr>
-              <a:t>), conjunction(i.e. </a:t>
-            </a:r>
-            <a:r>
-              <a:rPr lang="en-SG" b="1" i="1" dirty="0">
-                <a:solidFill>
-                  <a:srgbClr val="1C5A57"/>
-                </a:solidFill>
-                <a:latin typeface="Franklin Gothic Book" panose="020B0503020102020204" pitchFamily="34" charset="0"/>
-              </a:rPr>
-              <a:t>and, nor</a:t>
-            </a:r>
-            <a:r>
-              <a:rPr lang="en-SG" b="1" dirty="0">
-                <a:solidFill>
-                  <a:srgbClr val="1C5A57"/>
-                </a:solidFill>
-                <a:latin typeface="Franklin Gothic Book" panose="020B0503020102020204" pitchFamily="34" charset="0"/>
-              </a:rPr>
-              <a:t>), and comparative adjective(i.e. </a:t>
-            </a:r>
-            <a:r>
-              <a:rPr lang="en-SG" b="1" i="1" dirty="0">
-                <a:solidFill>
-                  <a:srgbClr val="1C5A57"/>
-                </a:solidFill>
-                <a:latin typeface="Franklin Gothic Book" panose="020B0503020102020204" pitchFamily="34" charset="0"/>
-              </a:rPr>
-              <a:t>best, bleaker</a:t>
-            </a:r>
-            <a:r>
-              <a:rPr lang="en-SG" b="1" dirty="0">
-                <a:solidFill>
-                  <a:srgbClr val="1C5A57"/>
-                </a:solidFill>
-                <a:latin typeface="Franklin Gothic Book" panose="020B0503020102020204" pitchFamily="34" charset="0"/>
-              </a:rPr>
-              <a:t>) </a:t>
-            </a:r>
           </a:p>
         </p:txBody>
       </p:sp>
@@ -8831,7 +9106,7 @@
     </p:spTree>
     <p:extLst>
       <p:ext uri="{BB962C8B-B14F-4D97-AF65-F5344CB8AC3E}">
-        <p14:creationId xmlns:p14="http://schemas.microsoft.com/office/powerpoint/2010/main" val="4140363535"/>
+        <p14:creationId xmlns:p14="http://schemas.microsoft.com/office/powerpoint/2010/main" val="1221570528"/>
       </p:ext>
     </p:extLst>
   </p:cSld>
@@ -8845,7 +9120,7 @@
 </file>
 
 <file path=ppt/slides/slide2.xml><?xml version="1.0" encoding="utf-8"?>
-<p:sld xmlns:a="http://schemas.openxmlformats.org/drawingml/2006/main" xmlns:r="http://schemas.openxmlformats.org/officeDocument/2006/relationships" xmlns:p="http://schemas.openxmlformats.org/presentationml/2006/main">
+<p:sld xmlns:a="http://schemas.openxmlformats.org/drawingml/2006/main" xmlns:r="http://schemas.openxmlformats.org/officeDocument/2006/relationships" xmlns:p="http://schemas.openxmlformats.org/presentationml/2006/main" show="0">
   <p:cSld>
     <p:spTree>
       <p:nvGrpSpPr>
@@ -8877,8 +9152,8 @@
         </p:nvSpPr>
         <p:spPr>
           <a:xfrm>
-            <a:off x="402136" y="152429"/>
-            <a:ext cx="5922464" cy="790422"/>
+            <a:off x="402135" y="152429"/>
+            <a:ext cx="7466979" cy="790422"/>
           </a:xfrm>
           <a:prstGeom prst="rect">
             <a:avLst/>
@@ -8951,7 +9226,7 @@
                 <a:latin typeface="MV Boli" panose="02000500030200090000" pitchFamily="2" charset="0"/>
                 <a:cs typeface="MV Boli" panose="02000500030200090000" pitchFamily="2" charset="0"/>
               </a:rPr>
-              <a:t>Mundane</a:t>
+              <a:t>not profound</a:t>
             </a:r>
             <a:r>
               <a:rPr lang="en-SG" sz="4200" b="1" dirty="0">
@@ -9056,6 +9331,388 @@
         <p:spPr>
           <a:xfrm>
             <a:off x="402134" y="525338"/>
+            <a:ext cx="6159652" cy="1231747"/>
+          </a:xfrm>
+          <a:prstGeom prst="rect">
+            <a:avLst/>
+          </a:prstGeom>
+          <a:ln>
+            <a:noFill/>
+          </a:ln>
+        </p:spPr>
+        <p:txBody>
+          <a:bodyPr vert="horz" lIns="91440" tIns="45720" rIns="91440" bIns="45720" rtlCol="0" anchor="ctr">
+            <a:normAutofit/>
+          </a:bodyPr>
+          <a:lstStyle>
+            <a:lvl1pPr algn="l" defTabSz="914400" rtl="0" eaLnBrk="1" latinLnBrk="0" hangingPunct="1">
+              <a:lnSpc>
+                <a:spcPct val="90000"/>
+              </a:lnSpc>
+              <a:spcBef>
+                <a:spcPct val="0"/>
+              </a:spcBef>
+              <a:buNone/>
+              <a:defRPr sz="4400" kern="1200">
+                <a:solidFill>
+                  <a:schemeClr val="tx1"/>
+                </a:solidFill>
+                <a:latin typeface="+mj-lt"/>
+                <a:ea typeface="+mj-ea"/>
+                <a:cs typeface="+mj-cs"/>
+              </a:defRPr>
+            </a:lvl1pPr>
+          </a:lstStyle>
+          <a:p>
+            <a:pPr>
+              <a:lnSpc>
+                <a:spcPct val="110000"/>
+              </a:lnSpc>
+            </a:pPr>
+            <a:r>
+              <a:rPr lang="en-SG" altLang="zh-CN" sz="3600" dirty="0">
+                <a:solidFill>
+                  <a:srgbClr val="623C4E"/>
+                </a:solidFill>
+                <a:latin typeface="Franklin Gothic Demi" panose="020B0703020102020204" pitchFamily="34" charset="0"/>
+              </a:rPr>
+              <a:t>Conclusion</a:t>
+            </a:r>
+          </a:p>
+        </p:txBody>
+      </p:sp>
+      <p:sp>
+        <p:nvSpPr>
+          <p:cNvPr id="11" name="Title 1">
+            <a:extLst>
+              <a:ext uri="{FF2B5EF4-FFF2-40B4-BE49-F238E27FC236}">
+                <a16:creationId xmlns:a16="http://schemas.microsoft.com/office/drawing/2014/main" id="{A0605D9D-85FD-4017-8BC3-918E66DB1187}"/>
+              </a:ext>
+            </a:extLst>
+          </p:cNvPr>
+          <p:cNvSpPr txBox="1">
+            <a:spLocks/>
+          </p:cNvSpPr>
+          <p:nvPr/>
+        </p:nvSpPr>
+        <p:spPr>
+          <a:xfrm>
+            <a:off x="1203615" y="2642222"/>
+            <a:ext cx="10488153" cy="3327063"/>
+          </a:xfrm>
+          <a:prstGeom prst="rect">
+            <a:avLst/>
+          </a:prstGeom>
+          <a:ln>
+            <a:noFill/>
+          </a:ln>
+        </p:spPr>
+        <p:txBody>
+          <a:bodyPr vert="horz" lIns="91440" tIns="45720" rIns="91440" bIns="45720" rtlCol="0" anchor="t">
+            <a:normAutofit/>
+          </a:bodyPr>
+          <a:lstStyle>
+            <a:lvl1pPr algn="l" defTabSz="914400" rtl="0" eaLnBrk="1" latinLnBrk="0" hangingPunct="1">
+              <a:lnSpc>
+                <a:spcPct val="90000"/>
+              </a:lnSpc>
+              <a:spcBef>
+                <a:spcPct val="0"/>
+              </a:spcBef>
+              <a:buNone/>
+              <a:defRPr sz="4400" kern="1200">
+                <a:solidFill>
+                  <a:schemeClr val="tx1"/>
+                </a:solidFill>
+                <a:latin typeface="+mj-lt"/>
+                <a:ea typeface="+mj-ea"/>
+                <a:cs typeface="+mj-cs"/>
+              </a:defRPr>
+            </a:lvl1pPr>
+          </a:lstStyle>
+          <a:p>
+            <a:pPr>
+              <a:lnSpc>
+                <a:spcPct val="110000"/>
+              </a:lnSpc>
+            </a:pPr>
+            <a:r>
+              <a:rPr lang="en-US" sz="3200" dirty="0">
+                <a:solidFill>
+                  <a:srgbClr val="1C5A57"/>
+                </a:solidFill>
+                <a:latin typeface="Franklin Gothic Demi" panose="020B0703020102020204" pitchFamily="34" charset="0"/>
+                <a:cs typeface="MV Boli" panose="02000500030200090000" pitchFamily="2" charset="0"/>
+              </a:rPr>
+              <a:t>Yes, profound quotes tend to have </a:t>
+            </a:r>
+            <a:r>
+              <a:rPr lang="en-US" sz="3200" b="1" u="sng" dirty="0">
+                <a:solidFill>
+                  <a:srgbClr val="1C5A57"/>
+                </a:solidFill>
+                <a:latin typeface="Franklin Gothic Demi" panose="020B0703020102020204" pitchFamily="34" charset="0"/>
+                <a:cs typeface="MV Boli" panose="02000500030200090000" pitchFamily="2" charset="0"/>
+              </a:rPr>
+              <a:t>longer sentence length</a:t>
+            </a:r>
+            <a:r>
+              <a:rPr lang="en-US" sz="3200" dirty="0">
+                <a:solidFill>
+                  <a:srgbClr val="1C5A57"/>
+                </a:solidFill>
+                <a:latin typeface="Franklin Gothic Demi" panose="020B0703020102020204" pitchFamily="34" charset="0"/>
+                <a:cs typeface="MV Boli" panose="02000500030200090000" pitchFamily="2" charset="0"/>
+              </a:rPr>
+              <a:t>, </a:t>
+            </a:r>
+            <a:r>
+              <a:rPr lang="en-US" sz="3200" b="1" u="sng" dirty="0">
+                <a:solidFill>
+                  <a:srgbClr val="1C5A57"/>
+                </a:solidFill>
+                <a:latin typeface="Franklin Gothic Demi" panose="020B0703020102020204" pitchFamily="34" charset="0"/>
+                <a:cs typeface="MV Boli" panose="02000500030200090000" pitchFamily="2" charset="0"/>
+              </a:rPr>
+              <a:t>more commas</a:t>
+            </a:r>
+            <a:r>
+              <a:rPr lang="en-US" sz="3200" dirty="0">
+                <a:solidFill>
+                  <a:srgbClr val="1C5A57"/>
+                </a:solidFill>
+                <a:latin typeface="Franklin Gothic Demi" panose="020B0703020102020204" pitchFamily="34" charset="0"/>
+                <a:cs typeface="MV Boli" panose="02000500030200090000" pitchFamily="2" charset="0"/>
+              </a:rPr>
+              <a:t>, </a:t>
+            </a:r>
+            <a:r>
+              <a:rPr lang="en-US" sz="3200" u="sng" dirty="0">
+                <a:solidFill>
+                  <a:srgbClr val="1C5A57"/>
+                </a:solidFill>
+                <a:latin typeface="Franklin Gothic Demi" panose="020B0703020102020204" pitchFamily="34" charset="0"/>
+                <a:cs typeface="MV Boli" panose="02000500030200090000" pitchFamily="2" charset="0"/>
+              </a:rPr>
+              <a:t>less neutral</a:t>
+            </a:r>
+            <a:r>
+              <a:rPr lang="en-US" sz="3200" dirty="0">
+                <a:solidFill>
+                  <a:srgbClr val="1C5A57"/>
+                </a:solidFill>
+                <a:latin typeface="Franklin Gothic Demi" panose="020B0703020102020204" pitchFamily="34" charset="0"/>
+                <a:cs typeface="MV Boli" panose="02000500030200090000" pitchFamily="2" charset="0"/>
+              </a:rPr>
+              <a:t>, </a:t>
+            </a:r>
+            <a:r>
+              <a:rPr lang="en-US" sz="3200" u="sng" dirty="0">
+                <a:solidFill>
+                  <a:srgbClr val="1C5A57"/>
+                </a:solidFill>
+                <a:latin typeface="Franklin Gothic Demi" panose="020B0703020102020204" pitchFamily="34" charset="0"/>
+                <a:cs typeface="MV Boli" panose="02000500030200090000" pitchFamily="2" charset="0"/>
+              </a:rPr>
+              <a:t>more </a:t>
+            </a:r>
+            <a:r>
+              <a:rPr lang="en-US" sz="3200" b="1" u="sng" dirty="0">
+                <a:solidFill>
+                  <a:srgbClr val="1C5A57"/>
+                </a:solidFill>
+                <a:latin typeface="Franklin Gothic Demi" panose="020B0703020102020204" pitchFamily="34" charset="0"/>
+                <a:cs typeface="MV Boli" panose="02000500030200090000" pitchFamily="2" charset="0"/>
+              </a:rPr>
+              <a:t>complex</a:t>
+            </a:r>
+            <a:r>
+              <a:rPr lang="en-US" sz="3200" u="sng" dirty="0">
+                <a:solidFill>
+                  <a:srgbClr val="1C5A57"/>
+                </a:solidFill>
+                <a:latin typeface="Franklin Gothic Demi" panose="020B0703020102020204" pitchFamily="34" charset="0"/>
+                <a:cs typeface="MV Boli" panose="02000500030200090000" pitchFamily="2" charset="0"/>
+              </a:rPr>
+              <a:t> </a:t>
+            </a:r>
+            <a:r>
+              <a:rPr lang="en-US" sz="3200" dirty="0">
+                <a:solidFill>
+                  <a:srgbClr val="1C5A57"/>
+                </a:solidFill>
+                <a:latin typeface="Franklin Gothic Demi" panose="020B0703020102020204" pitchFamily="34" charset="0"/>
+                <a:cs typeface="MV Boli" panose="02000500030200090000" pitchFamily="2" charset="0"/>
+              </a:rPr>
+              <a:t>in </a:t>
+            </a:r>
+            <a:r>
+              <a:rPr lang="en-US" sz="3200" b="1" dirty="0">
+                <a:solidFill>
+                  <a:srgbClr val="1C5A57"/>
+                </a:solidFill>
+                <a:latin typeface="Franklin Gothic Demi" panose="020B0703020102020204" pitchFamily="34" charset="0"/>
+                <a:cs typeface="MV Boli" panose="02000500030200090000" pitchFamily="2" charset="0"/>
+              </a:rPr>
+              <a:t>sentence structure</a:t>
+            </a:r>
+            <a:r>
+              <a:rPr lang="en-US" sz="3200" dirty="0">
+                <a:solidFill>
+                  <a:srgbClr val="1C5A57"/>
+                </a:solidFill>
+                <a:latin typeface="Franklin Gothic Demi" panose="020B0703020102020204" pitchFamily="34" charset="0"/>
+                <a:cs typeface="MV Boli" panose="02000500030200090000" pitchFamily="2" charset="0"/>
+              </a:rPr>
+              <a:t> and </a:t>
+            </a:r>
+            <a:r>
+              <a:rPr lang="en-US" sz="3200" b="1" dirty="0">
+                <a:solidFill>
+                  <a:srgbClr val="1C5A57"/>
+                </a:solidFill>
+                <a:latin typeface="Franklin Gothic Demi" panose="020B0703020102020204" pitchFamily="34" charset="0"/>
+                <a:cs typeface="MV Boli" panose="02000500030200090000" pitchFamily="2" charset="0"/>
+              </a:rPr>
+              <a:t>grammar</a:t>
+            </a:r>
+            <a:r>
+              <a:rPr lang="en-US" sz="3200" dirty="0">
+                <a:solidFill>
+                  <a:srgbClr val="1C5A57"/>
+                </a:solidFill>
+                <a:latin typeface="Franklin Gothic Demi" panose="020B0703020102020204" pitchFamily="34" charset="0"/>
+                <a:cs typeface="MV Boli" panose="02000500030200090000" pitchFamily="2" charset="0"/>
+              </a:rPr>
+              <a:t>.</a:t>
+            </a:r>
+            <a:endParaRPr lang="en-SG" sz="3200" dirty="0">
+              <a:solidFill>
+                <a:srgbClr val="1C5A57"/>
+              </a:solidFill>
+              <a:latin typeface="MV Boli" panose="02000500030200090000" pitchFamily="2" charset="0"/>
+              <a:cs typeface="MV Boli" panose="02000500030200090000" pitchFamily="2" charset="0"/>
+            </a:endParaRPr>
+          </a:p>
+        </p:txBody>
+      </p:sp>
+      <p:sp>
+        <p:nvSpPr>
+          <p:cNvPr id="8" name="Title 1">
+            <a:extLst>
+              <a:ext uri="{FF2B5EF4-FFF2-40B4-BE49-F238E27FC236}">
+                <a16:creationId xmlns:a16="http://schemas.microsoft.com/office/drawing/2014/main" id="{0FC059C2-5C5D-4456-A8F5-191D6DD67E9E}"/>
+              </a:ext>
+            </a:extLst>
+          </p:cNvPr>
+          <p:cNvSpPr txBox="1">
+            <a:spLocks/>
+          </p:cNvSpPr>
+          <p:nvPr/>
+        </p:nvSpPr>
+        <p:spPr>
+          <a:xfrm>
+            <a:off x="402136" y="152429"/>
+            <a:ext cx="9823178" cy="790422"/>
+          </a:xfrm>
+          <a:prstGeom prst="rect">
+            <a:avLst/>
+          </a:prstGeom>
+          <a:ln>
+            <a:noFill/>
+          </a:ln>
+        </p:spPr>
+        <p:txBody>
+          <a:bodyPr vert="horz" lIns="91440" tIns="45720" rIns="91440" bIns="45720" rtlCol="0" anchor="ctr">
+            <a:normAutofit fontScale="92500"/>
+          </a:bodyPr>
+          <a:lstStyle>
+            <a:lvl1pPr algn="l" defTabSz="914400" rtl="0" eaLnBrk="1" latinLnBrk="0" hangingPunct="1">
+              <a:lnSpc>
+                <a:spcPct val="90000"/>
+              </a:lnSpc>
+              <a:spcBef>
+                <a:spcPct val="0"/>
+              </a:spcBef>
+              <a:buNone/>
+              <a:defRPr sz="4400" kern="1200">
+                <a:solidFill>
+                  <a:schemeClr val="tx1"/>
+                </a:solidFill>
+                <a:latin typeface="+mj-lt"/>
+                <a:ea typeface="+mj-ea"/>
+                <a:cs typeface="+mj-cs"/>
+              </a:defRPr>
+            </a:lvl1pPr>
+          </a:lstStyle>
+          <a:p>
+            <a:pPr>
+              <a:lnSpc>
+                <a:spcPct val="110000"/>
+              </a:lnSpc>
+            </a:pPr>
+            <a:r>
+              <a:rPr lang="en-SG" sz="4200" b="1" dirty="0">
+                <a:solidFill>
+                  <a:srgbClr val="1C5A57"/>
+                </a:solidFill>
+                <a:latin typeface="Franklin Gothic Demi" panose="020B0703020102020204" pitchFamily="34" charset="0"/>
+              </a:rPr>
+              <a:t>1. Is there a pattern to profound sentence?</a:t>
+            </a:r>
+          </a:p>
+        </p:txBody>
+      </p:sp>
+    </p:spTree>
+    <p:extLst>
+      <p:ext uri="{BB962C8B-B14F-4D97-AF65-F5344CB8AC3E}">
+        <p14:creationId xmlns:p14="http://schemas.microsoft.com/office/powerpoint/2010/main" val="469708960"/>
+      </p:ext>
+    </p:extLst>
+  </p:cSld>
+  <p:clrMapOvr>
+    <a:masterClrMapping/>
+  </p:clrMapOvr>
+  <p:transition spd="slow">
+    <p:push dir="u"/>
+  </p:transition>
+</p:sld>
+</file>
+
+<file path=ppt/slides/slide21.xml><?xml version="1.0" encoding="utf-8"?>
+<p:sld xmlns:a="http://schemas.openxmlformats.org/drawingml/2006/main" xmlns:r="http://schemas.openxmlformats.org/officeDocument/2006/relationships" xmlns:p="http://schemas.openxmlformats.org/presentationml/2006/main">
+  <p:cSld>
+    <p:spTree>
+      <p:nvGrpSpPr>
+        <p:cNvPr id="1" name=""/>
+        <p:cNvGrpSpPr/>
+        <p:nvPr/>
+      </p:nvGrpSpPr>
+      <p:grpSpPr>
+        <a:xfrm>
+          <a:off x="0" y="0"/>
+          <a:ext cx="0" cy="0"/>
+          <a:chOff x="0" y="0"/>
+          <a:chExt cx="0" cy="0"/>
+        </a:xfrm>
+      </p:grpSpPr>
+      <p:sp>
+        <p:nvSpPr>
+          <p:cNvPr id="10" name="Title 1">
+            <a:extLst>
+              <a:ext uri="{FF2B5EF4-FFF2-40B4-BE49-F238E27FC236}">
+                <a16:creationId xmlns:a16="http://schemas.microsoft.com/office/drawing/2014/main" id="{93F30793-9CFE-4B78-A18E-E2C303B331AE}"/>
+              </a:ext>
+            </a:extLst>
+          </p:cNvPr>
+          <p:cNvSpPr txBox="1">
+            <a:spLocks/>
+          </p:cNvSpPr>
+          <p:nvPr/>
+        </p:nvSpPr>
+        <p:spPr>
+          <a:xfrm>
+            <a:off x="402134" y="525338"/>
             <a:ext cx="4874715" cy="1231747"/>
           </a:xfrm>
           <a:prstGeom prst="rect">
@@ -9439,7 +10096,7 @@
 </p:sld>
 </file>
 
-<file path=ppt/slides/slide21.xml><?xml version="1.0" encoding="utf-8"?>
+<file path=ppt/slides/slide22.xml><?xml version="1.0" encoding="utf-8"?>
 <p:sld xmlns:a="http://schemas.openxmlformats.org/drawingml/2006/main" xmlns:r="http://schemas.openxmlformats.org/officeDocument/2006/relationships" xmlns:p="http://schemas.openxmlformats.org/presentationml/2006/main">
   <p:cSld>
     <p:spTree>
@@ -10540,7 +11197,7 @@
 </p:sld>
 </file>
 
-<file path=ppt/slides/slide22.xml><?xml version="1.0" encoding="utf-8"?>
+<file path=ppt/slides/slide23.xml><?xml version="1.0" encoding="utf-8"?>
 <p:sld xmlns:a="http://schemas.openxmlformats.org/drawingml/2006/main" xmlns:r="http://schemas.openxmlformats.org/officeDocument/2006/relationships" xmlns:p="http://schemas.openxmlformats.org/presentationml/2006/main">
   <p:cSld>
     <p:spTree>
@@ -10969,7 +11626,7 @@
 </p:sld>
 </file>
 
-<file path=ppt/slides/slide23.xml><?xml version="1.0" encoding="utf-8"?>
+<file path=ppt/slides/slide24.xml><?xml version="1.0" encoding="utf-8"?>
 <p:sld xmlns:a="http://schemas.openxmlformats.org/drawingml/2006/main" xmlns:r="http://schemas.openxmlformats.org/officeDocument/2006/relationships" xmlns:p="http://schemas.openxmlformats.org/presentationml/2006/main">
   <p:cSld>
     <p:spTree>
@@ -11263,7 +11920,7 @@
 </p:sld>
 </file>
 
-<file path=ppt/slides/slide24.xml><?xml version="1.0" encoding="utf-8"?>
+<file path=ppt/slides/slide25.xml><?xml version="1.0" encoding="utf-8"?>
 <p:sld xmlns:a="http://schemas.openxmlformats.org/drawingml/2006/main" xmlns:r="http://schemas.openxmlformats.org/officeDocument/2006/relationships" xmlns:p="http://schemas.openxmlformats.org/presentationml/2006/main">
   <p:cSld>
     <p:spTree>
@@ -12520,7 +13177,7 @@
 </p:sld>
 </file>
 
-<file path=ppt/slides/slide25.xml><?xml version="1.0" encoding="utf-8"?>
+<file path=ppt/slides/slide26.xml><?xml version="1.0" encoding="utf-8"?>
 <p:sld xmlns:a="http://schemas.openxmlformats.org/drawingml/2006/main" xmlns:r="http://schemas.openxmlformats.org/officeDocument/2006/relationships" xmlns:p="http://schemas.openxmlformats.org/presentationml/2006/main">
   <p:cSld>
     <p:spTree>
@@ -13565,7 +14222,7 @@
 </p:sld>
 </file>
 
-<file path=ppt/slides/slide26.xml><?xml version="1.0" encoding="utf-8"?>
+<file path=ppt/slides/slide27.xml><?xml version="1.0" encoding="utf-8"?>
 <p:sld xmlns:a="http://schemas.openxmlformats.org/drawingml/2006/main" xmlns:r="http://schemas.openxmlformats.org/officeDocument/2006/relationships" xmlns:p="http://schemas.openxmlformats.org/presentationml/2006/main" show="0">
   <p:cSld>
     <p:spTree>
@@ -14593,7 +15250,7 @@
 </p:sld>
 </file>
 
-<file path=ppt/slides/slide27.xml><?xml version="1.0" encoding="utf-8"?>
+<file path=ppt/slides/slide28.xml><?xml version="1.0" encoding="utf-8"?>
 <p:sld xmlns:a="http://schemas.openxmlformats.org/drawingml/2006/main" xmlns:r="http://schemas.openxmlformats.org/officeDocument/2006/relationships" xmlns:p="http://schemas.openxmlformats.org/presentationml/2006/main">
   <p:cSld>
     <p:spTree>
@@ -14768,8 +15425,8 @@
 </p:sld>
 </file>
 
-<file path=ppt/slides/slide28.xml><?xml version="1.0" encoding="utf-8"?>
-<p:sld xmlns:a="http://schemas.openxmlformats.org/drawingml/2006/main" xmlns:r="http://schemas.openxmlformats.org/officeDocument/2006/relationships" xmlns:p="http://schemas.openxmlformats.org/presentationml/2006/main">
+<file path=ppt/slides/slide29.xml><?xml version="1.0" encoding="utf-8"?>
+<p:sld xmlns:a="http://schemas.openxmlformats.org/drawingml/2006/main" xmlns:r="http://schemas.openxmlformats.org/officeDocument/2006/relationships" xmlns:p="http://schemas.openxmlformats.org/presentationml/2006/main" show="0">
   <p:cSld>
     <p:spTree>
       <p:nvGrpSpPr>
@@ -16007,8 +16664,8 @@
 </p:sld>
 </file>
 
-<file path=ppt/slides/slide29.xml><?xml version="1.0" encoding="utf-8"?>
-<p:sld xmlns:a="http://schemas.openxmlformats.org/drawingml/2006/main" xmlns:r="http://schemas.openxmlformats.org/officeDocument/2006/relationships" xmlns:p="http://schemas.openxmlformats.org/presentationml/2006/main">
+<file path=ppt/slides/slide3.xml><?xml version="1.0" encoding="utf-8"?>
+<p:sld xmlns:a="http://schemas.openxmlformats.org/drawingml/2006/main" xmlns:r="http://schemas.openxmlformats.org/officeDocument/2006/relationships" xmlns:p="http://schemas.openxmlformats.org/presentationml/2006/main" show="0">
   <p:cSld>
     <p:spTree>
       <p:nvGrpSpPr>
@@ -16026,10 +16683,53 @@
       </p:grpSpPr>
       <p:sp>
         <p:nvSpPr>
-          <p:cNvPr id="6" name="Title 1">
+          <p:cNvPr id="3" name="Content Placeholder 2">
             <a:extLst>
               <a:ext uri="{FF2B5EF4-FFF2-40B4-BE49-F238E27FC236}">
-                <a16:creationId xmlns:a16="http://schemas.microsoft.com/office/drawing/2014/main" id="{B0087C6E-B92B-4A0C-83AC-05B919D152B3}"/>
+                <a16:creationId xmlns:a16="http://schemas.microsoft.com/office/drawing/2014/main" id="{870D7BE5-4B8B-4FBF-BB21-9A7980227314}"/>
+              </a:ext>
+            </a:extLst>
+          </p:cNvPr>
+          <p:cNvSpPr>
+            <a:spLocks noGrp="1"/>
+          </p:cNvSpPr>
+          <p:nvPr>
+            <p:ph idx="1"/>
+          </p:nvPr>
+        </p:nvSpPr>
+        <p:spPr>
+          <a:xfrm>
+            <a:off x="2528887" y="2844800"/>
+            <a:ext cx="7134225" cy="727075"/>
+          </a:xfrm>
+        </p:spPr>
+        <p:txBody>
+          <a:bodyPr>
+            <a:normAutofit/>
+          </a:bodyPr>
+          <a:lstStyle/>
+          <a:p>
+            <a:pPr marL="0" indent="0" algn="ctr">
+              <a:buNone/>
+            </a:pPr>
+            <a:r>
+              <a:rPr lang="en-SG" b="1" dirty="0">
+                <a:solidFill>
+                  <a:srgbClr val="623C4E"/>
+                </a:solidFill>
+                <a:latin typeface="Franklin Gothic Book" panose="020B0503020102020204" pitchFamily="34" charset="0"/>
+              </a:rPr>
+              <a:t>Like most men my age, I'm 51.</a:t>
+            </a:r>
+          </a:p>
+        </p:txBody>
+      </p:sp>
+      <p:sp>
+        <p:nvSpPr>
+          <p:cNvPr id="5" name="Title 1">
+            <a:extLst>
+              <a:ext uri="{FF2B5EF4-FFF2-40B4-BE49-F238E27FC236}">
+                <a16:creationId xmlns:a16="http://schemas.microsoft.com/office/drawing/2014/main" id="{58F079EC-C562-4B44-A760-8B11F35427D7}"/>
               </a:ext>
             </a:extLst>
           </p:cNvPr>
@@ -16041,7 +16741,7 @@
         <p:spPr>
           <a:xfrm>
             <a:off x="402135" y="152429"/>
-            <a:ext cx="8656139" cy="790422"/>
+            <a:ext cx="7466979" cy="790422"/>
           </a:xfrm>
           <a:prstGeom prst="rect">
             <a:avLst/>
@@ -16086,473 +16786,6 @@
                 </a:solidFill>
                 <a:latin typeface="Franklin Gothic Demi" panose="020B0703020102020204" pitchFamily="34" charset="0"/>
               </a:rPr>
-              <a:t>Limitations and Future Directions</a:t>
-            </a:r>
-            <a:endParaRPr lang="en-SG" sz="4200" b="1" dirty="0">
-              <a:latin typeface="MV Boli" panose="02000500030200090000" pitchFamily="2" charset="0"/>
-              <a:cs typeface="MV Boli" panose="02000500030200090000" pitchFamily="2" charset="0"/>
-            </a:endParaRPr>
-          </a:p>
-        </p:txBody>
-      </p:sp>
-      <p:sp>
-        <p:nvSpPr>
-          <p:cNvPr id="7" name="Content Placeholder 2">
-            <a:extLst>
-              <a:ext uri="{FF2B5EF4-FFF2-40B4-BE49-F238E27FC236}">
-                <a16:creationId xmlns:a16="http://schemas.microsoft.com/office/drawing/2014/main" id="{F8E95695-D1C9-40A8-A177-A3190E00CFD1}"/>
-              </a:ext>
-            </a:extLst>
-          </p:cNvPr>
-          <p:cNvSpPr txBox="1">
-            <a:spLocks/>
-          </p:cNvSpPr>
-          <p:nvPr/>
-        </p:nvSpPr>
-        <p:spPr>
-          <a:xfrm>
-            <a:off x="828675" y="1424382"/>
-            <a:ext cx="10963275" cy="5029387"/>
-          </a:xfrm>
-          <a:prstGeom prst="rect">
-            <a:avLst/>
-          </a:prstGeom>
-        </p:spPr>
-        <p:txBody>
-          <a:bodyPr vert="horz" lIns="91440" tIns="45720" rIns="91440" bIns="45720" rtlCol="0">
-            <a:normAutofit/>
-          </a:bodyPr>
-          <a:lstStyle>
-            <a:lvl1pPr marL="228600" indent="-228600" algn="l" defTabSz="914400" rtl="0" eaLnBrk="1" latinLnBrk="0" hangingPunct="1">
-              <a:lnSpc>
-                <a:spcPct val="90000"/>
-              </a:lnSpc>
-              <a:spcBef>
-                <a:spcPts val="1000"/>
-              </a:spcBef>
-              <a:buFont typeface="Arial" panose="020B0604020202020204" pitchFamily="34" charset="0"/>
-              <a:buChar char="•"/>
-              <a:defRPr sz="2800" kern="1200">
-                <a:solidFill>
-                  <a:schemeClr val="tx1"/>
-                </a:solidFill>
-                <a:latin typeface="+mn-lt"/>
-                <a:ea typeface="+mn-ea"/>
-                <a:cs typeface="+mn-cs"/>
-              </a:defRPr>
-            </a:lvl1pPr>
-            <a:lvl2pPr marL="685800" indent="-228600" algn="l" defTabSz="914400" rtl="0" eaLnBrk="1" latinLnBrk="0" hangingPunct="1">
-              <a:lnSpc>
-                <a:spcPct val="90000"/>
-              </a:lnSpc>
-              <a:spcBef>
-                <a:spcPts val="500"/>
-              </a:spcBef>
-              <a:buFont typeface="Arial" panose="020B0604020202020204" pitchFamily="34" charset="0"/>
-              <a:buChar char="•"/>
-              <a:defRPr sz="2400" kern="1200">
-                <a:solidFill>
-                  <a:schemeClr val="tx1"/>
-                </a:solidFill>
-                <a:latin typeface="+mn-lt"/>
-                <a:ea typeface="+mn-ea"/>
-                <a:cs typeface="+mn-cs"/>
-              </a:defRPr>
-            </a:lvl2pPr>
-            <a:lvl3pPr marL="1143000" indent="-228600" algn="l" defTabSz="914400" rtl="0" eaLnBrk="1" latinLnBrk="0" hangingPunct="1">
-              <a:lnSpc>
-                <a:spcPct val="90000"/>
-              </a:lnSpc>
-              <a:spcBef>
-                <a:spcPts val="500"/>
-              </a:spcBef>
-              <a:buFont typeface="Arial" panose="020B0604020202020204" pitchFamily="34" charset="0"/>
-              <a:buChar char="•"/>
-              <a:defRPr sz="2000" kern="1200">
-                <a:solidFill>
-                  <a:schemeClr val="tx1"/>
-                </a:solidFill>
-                <a:latin typeface="+mn-lt"/>
-                <a:ea typeface="+mn-ea"/>
-                <a:cs typeface="+mn-cs"/>
-              </a:defRPr>
-            </a:lvl3pPr>
-            <a:lvl4pPr marL="1600200" indent="-228600" algn="l" defTabSz="914400" rtl="0" eaLnBrk="1" latinLnBrk="0" hangingPunct="1">
-              <a:lnSpc>
-                <a:spcPct val="90000"/>
-              </a:lnSpc>
-              <a:spcBef>
-                <a:spcPts val="500"/>
-              </a:spcBef>
-              <a:buFont typeface="Arial" panose="020B0604020202020204" pitchFamily="34" charset="0"/>
-              <a:buChar char="•"/>
-              <a:defRPr sz="1800" kern="1200">
-                <a:solidFill>
-                  <a:schemeClr val="tx1"/>
-                </a:solidFill>
-                <a:latin typeface="+mn-lt"/>
-                <a:ea typeface="+mn-ea"/>
-                <a:cs typeface="+mn-cs"/>
-              </a:defRPr>
-            </a:lvl4pPr>
-            <a:lvl5pPr marL="2057400" indent="-228600" algn="l" defTabSz="914400" rtl="0" eaLnBrk="1" latinLnBrk="0" hangingPunct="1">
-              <a:lnSpc>
-                <a:spcPct val="90000"/>
-              </a:lnSpc>
-              <a:spcBef>
-                <a:spcPts val="500"/>
-              </a:spcBef>
-              <a:buFont typeface="Arial" panose="020B0604020202020204" pitchFamily="34" charset="0"/>
-              <a:buChar char="•"/>
-              <a:defRPr sz="1800" kern="1200">
-                <a:solidFill>
-                  <a:schemeClr val="tx1"/>
-                </a:solidFill>
-                <a:latin typeface="+mn-lt"/>
-                <a:ea typeface="+mn-ea"/>
-                <a:cs typeface="+mn-cs"/>
-              </a:defRPr>
-            </a:lvl5pPr>
-            <a:lvl6pPr marL="2514600" indent="-228600" algn="l" defTabSz="914400" rtl="0" eaLnBrk="1" latinLnBrk="0" hangingPunct="1">
-              <a:lnSpc>
-                <a:spcPct val="90000"/>
-              </a:lnSpc>
-              <a:spcBef>
-                <a:spcPts val="500"/>
-              </a:spcBef>
-              <a:buFont typeface="Arial" panose="020B0604020202020204" pitchFamily="34" charset="0"/>
-              <a:buChar char="•"/>
-              <a:defRPr sz="1800" kern="1200">
-                <a:solidFill>
-                  <a:schemeClr val="tx1"/>
-                </a:solidFill>
-                <a:latin typeface="+mn-lt"/>
-                <a:ea typeface="+mn-ea"/>
-                <a:cs typeface="+mn-cs"/>
-              </a:defRPr>
-            </a:lvl6pPr>
-            <a:lvl7pPr marL="2971800" indent="-228600" algn="l" defTabSz="914400" rtl="0" eaLnBrk="1" latinLnBrk="0" hangingPunct="1">
-              <a:lnSpc>
-                <a:spcPct val="90000"/>
-              </a:lnSpc>
-              <a:spcBef>
-                <a:spcPts val="500"/>
-              </a:spcBef>
-              <a:buFont typeface="Arial" panose="020B0604020202020204" pitchFamily="34" charset="0"/>
-              <a:buChar char="•"/>
-              <a:defRPr sz="1800" kern="1200">
-                <a:solidFill>
-                  <a:schemeClr val="tx1"/>
-                </a:solidFill>
-                <a:latin typeface="+mn-lt"/>
-                <a:ea typeface="+mn-ea"/>
-                <a:cs typeface="+mn-cs"/>
-              </a:defRPr>
-            </a:lvl7pPr>
-            <a:lvl8pPr marL="3429000" indent="-228600" algn="l" defTabSz="914400" rtl="0" eaLnBrk="1" latinLnBrk="0" hangingPunct="1">
-              <a:lnSpc>
-                <a:spcPct val="90000"/>
-              </a:lnSpc>
-              <a:spcBef>
-                <a:spcPts val="500"/>
-              </a:spcBef>
-              <a:buFont typeface="Arial" panose="020B0604020202020204" pitchFamily="34" charset="0"/>
-              <a:buChar char="•"/>
-              <a:defRPr sz="1800" kern="1200">
-                <a:solidFill>
-                  <a:schemeClr val="tx1"/>
-                </a:solidFill>
-                <a:latin typeface="+mn-lt"/>
-                <a:ea typeface="+mn-ea"/>
-                <a:cs typeface="+mn-cs"/>
-              </a:defRPr>
-            </a:lvl8pPr>
-            <a:lvl9pPr marL="3886200" indent="-228600" algn="l" defTabSz="914400" rtl="0" eaLnBrk="1" latinLnBrk="0" hangingPunct="1">
-              <a:lnSpc>
-                <a:spcPct val="90000"/>
-              </a:lnSpc>
-              <a:spcBef>
-                <a:spcPts val="500"/>
-              </a:spcBef>
-              <a:buFont typeface="Arial" panose="020B0604020202020204" pitchFamily="34" charset="0"/>
-              <a:buChar char="•"/>
-              <a:defRPr sz="1800" kern="1200">
-                <a:solidFill>
-                  <a:schemeClr val="tx1"/>
-                </a:solidFill>
-                <a:latin typeface="+mn-lt"/>
-                <a:ea typeface="+mn-ea"/>
-                <a:cs typeface="+mn-cs"/>
-              </a:defRPr>
-            </a:lvl9pPr>
-          </a:lstStyle>
-          <a:p>
-            <a:pPr marL="514350" indent="-514350" algn="just">
-              <a:lnSpc>
-                <a:spcPct val="130000"/>
-              </a:lnSpc>
-              <a:buFont typeface="Arial" panose="020B0604020202020204" pitchFamily="34" charset="0"/>
-              <a:buAutoNum type="arabicPeriod"/>
-            </a:pPr>
-            <a:r>
-              <a:rPr lang="en-SG" b="1" i="1" dirty="0">
-                <a:solidFill>
-                  <a:srgbClr val="1C5A57"/>
-                </a:solidFill>
-                <a:latin typeface="Franklin Gothic Demi" panose="020B0703020102020204" pitchFamily="34" charset="0"/>
-              </a:rPr>
-              <a:t>Cleaner data – samples which are correctly labelled</a:t>
-            </a:r>
-          </a:p>
-          <a:p>
-            <a:pPr marL="514350" indent="-514350" algn="just">
-              <a:lnSpc>
-                <a:spcPct val="130000"/>
-              </a:lnSpc>
-              <a:buFont typeface="Arial" panose="020B0604020202020204" pitchFamily="34" charset="0"/>
-              <a:buAutoNum type="arabicPeriod"/>
-            </a:pPr>
-            <a:endParaRPr lang="en-SG" b="1" i="1" dirty="0">
-              <a:solidFill>
-                <a:srgbClr val="1C5A57"/>
-              </a:solidFill>
-              <a:latin typeface="Franklin Gothic Demi" panose="020B0703020102020204" pitchFamily="34" charset="0"/>
-            </a:endParaRPr>
-          </a:p>
-          <a:p>
-            <a:pPr marL="514350" indent="-514350" algn="just">
-              <a:lnSpc>
-                <a:spcPct val="130000"/>
-              </a:lnSpc>
-              <a:buFont typeface="Arial" panose="020B0604020202020204" pitchFamily="34" charset="0"/>
-              <a:buAutoNum type="arabicPeriod"/>
-            </a:pPr>
-            <a:r>
-              <a:rPr lang="en-SG" b="1" i="1" dirty="0">
-                <a:solidFill>
-                  <a:srgbClr val="1C5A57"/>
-                </a:solidFill>
-                <a:latin typeface="Franklin Gothic Demi" panose="020B0703020102020204" pitchFamily="34" charset="0"/>
-              </a:rPr>
-              <a:t>Word corpus – a corpus of profound terms or shallow words/internet slangs as reference for our classifier</a:t>
-            </a:r>
-          </a:p>
-          <a:p>
-            <a:pPr marL="514350" indent="-514350" algn="just">
-              <a:lnSpc>
-                <a:spcPct val="130000"/>
-              </a:lnSpc>
-              <a:buFont typeface="Arial" panose="020B0604020202020204" pitchFamily="34" charset="0"/>
-              <a:buAutoNum type="arabicPeriod"/>
-            </a:pPr>
-            <a:endParaRPr lang="en-SG" b="1" i="1" dirty="0">
-              <a:solidFill>
-                <a:srgbClr val="1C5A57"/>
-              </a:solidFill>
-              <a:latin typeface="Franklin Gothic Demi" panose="020B0703020102020204" pitchFamily="34" charset="0"/>
-            </a:endParaRPr>
-          </a:p>
-          <a:p>
-            <a:pPr marL="514350" indent="-514350" algn="just">
-              <a:lnSpc>
-                <a:spcPct val="130000"/>
-              </a:lnSpc>
-              <a:buFont typeface="Arial" panose="020B0604020202020204" pitchFamily="34" charset="0"/>
-              <a:buAutoNum type="arabicPeriod"/>
-            </a:pPr>
-            <a:r>
-              <a:rPr lang="en-SG" b="1" i="1" dirty="0">
-                <a:solidFill>
-                  <a:srgbClr val="1C5A57"/>
-                </a:solidFill>
-                <a:latin typeface="Franklin Gothic Demi" panose="020B0703020102020204" pitchFamily="34" charset="0"/>
-              </a:rPr>
-              <a:t>Contextual analysis – Methods to understand context and relations</a:t>
-            </a:r>
-          </a:p>
-          <a:p>
-            <a:pPr marL="0" indent="0" algn="just">
-              <a:lnSpc>
-                <a:spcPct val="130000"/>
-              </a:lnSpc>
-              <a:buNone/>
-            </a:pPr>
-            <a:endParaRPr lang="en-SG" b="1" i="1" dirty="0">
-              <a:solidFill>
-                <a:srgbClr val="1C5A57"/>
-              </a:solidFill>
-              <a:latin typeface="Franklin Gothic Demi" panose="020B0703020102020204" pitchFamily="34" charset="0"/>
-            </a:endParaRPr>
-          </a:p>
-          <a:p>
-            <a:pPr marL="514350" indent="-514350" algn="just">
-              <a:lnSpc>
-                <a:spcPct val="130000"/>
-              </a:lnSpc>
-              <a:buFont typeface="Arial" panose="020B0604020202020204" pitchFamily="34" charset="0"/>
-              <a:buAutoNum type="arabicPeriod"/>
-            </a:pPr>
-            <a:endParaRPr lang="en-SG" b="1" i="1" dirty="0">
-              <a:solidFill>
-                <a:srgbClr val="1C5A57"/>
-              </a:solidFill>
-              <a:latin typeface="Franklin Gothic Demi" panose="020B0703020102020204" pitchFamily="34" charset="0"/>
-            </a:endParaRPr>
-          </a:p>
-          <a:p>
-            <a:pPr marL="0" indent="0" algn="just">
-              <a:lnSpc>
-                <a:spcPct val="130000"/>
-              </a:lnSpc>
-              <a:buNone/>
-            </a:pPr>
-            <a:endParaRPr lang="en-SG" b="1" i="1" dirty="0">
-              <a:solidFill>
-                <a:srgbClr val="1C5A57"/>
-              </a:solidFill>
-              <a:latin typeface="Franklin Gothic Demi" panose="020B0703020102020204" pitchFamily="34" charset="0"/>
-            </a:endParaRPr>
-          </a:p>
-        </p:txBody>
-      </p:sp>
-    </p:spTree>
-    <p:extLst>
-      <p:ext uri="{BB962C8B-B14F-4D97-AF65-F5344CB8AC3E}">
-        <p14:creationId xmlns:p14="http://schemas.microsoft.com/office/powerpoint/2010/main" val="1221840576"/>
-      </p:ext>
-    </p:extLst>
-  </p:cSld>
-  <p:clrMapOvr>
-    <a:masterClrMapping/>
-  </p:clrMapOvr>
-  <p:transition spd="slow">
-    <p:push dir="u"/>
-  </p:transition>
-</p:sld>
-</file>
-
-<file path=ppt/slides/slide3.xml><?xml version="1.0" encoding="utf-8"?>
-<p:sld xmlns:a="http://schemas.openxmlformats.org/drawingml/2006/main" xmlns:r="http://schemas.openxmlformats.org/officeDocument/2006/relationships" xmlns:p="http://schemas.openxmlformats.org/presentationml/2006/main">
-  <p:cSld>
-    <p:spTree>
-      <p:nvGrpSpPr>
-        <p:cNvPr id="1" name=""/>
-        <p:cNvGrpSpPr/>
-        <p:nvPr/>
-      </p:nvGrpSpPr>
-      <p:grpSpPr>
-        <a:xfrm>
-          <a:off x="0" y="0"/>
-          <a:ext cx="0" cy="0"/>
-          <a:chOff x="0" y="0"/>
-          <a:chExt cx="0" cy="0"/>
-        </a:xfrm>
-      </p:grpSpPr>
-      <p:sp>
-        <p:nvSpPr>
-          <p:cNvPr id="3" name="Content Placeholder 2">
-            <a:extLst>
-              <a:ext uri="{FF2B5EF4-FFF2-40B4-BE49-F238E27FC236}">
-                <a16:creationId xmlns:a16="http://schemas.microsoft.com/office/drawing/2014/main" id="{870D7BE5-4B8B-4FBF-BB21-9A7980227314}"/>
-              </a:ext>
-            </a:extLst>
-          </p:cNvPr>
-          <p:cNvSpPr>
-            <a:spLocks noGrp="1"/>
-          </p:cNvSpPr>
-          <p:nvPr>
-            <p:ph idx="1"/>
-          </p:nvPr>
-        </p:nvSpPr>
-        <p:spPr>
-          <a:xfrm>
-            <a:off x="2528887" y="2844800"/>
-            <a:ext cx="7134225" cy="727075"/>
-          </a:xfrm>
-        </p:spPr>
-        <p:txBody>
-          <a:bodyPr>
-            <a:normAutofit/>
-          </a:bodyPr>
-          <a:lstStyle/>
-          <a:p>
-            <a:pPr marL="0" indent="0" algn="ctr">
-              <a:buNone/>
-            </a:pPr>
-            <a:r>
-              <a:rPr lang="en-SG" b="1" dirty="0">
-                <a:solidFill>
-                  <a:srgbClr val="623C4E"/>
-                </a:solidFill>
-                <a:latin typeface="Franklin Gothic Book" panose="020B0503020102020204" pitchFamily="34" charset="0"/>
-              </a:rPr>
-              <a:t>Like most men my age, I'm 51.</a:t>
-            </a:r>
-          </a:p>
-        </p:txBody>
-      </p:sp>
-      <p:sp>
-        <p:nvSpPr>
-          <p:cNvPr id="4" name="Title 1">
-            <a:extLst>
-              <a:ext uri="{FF2B5EF4-FFF2-40B4-BE49-F238E27FC236}">
-                <a16:creationId xmlns:a16="http://schemas.microsoft.com/office/drawing/2014/main" id="{F6DA9423-98F1-452C-B869-749949909D44}"/>
-              </a:ext>
-            </a:extLst>
-          </p:cNvPr>
-          <p:cNvSpPr txBox="1">
-            <a:spLocks/>
-          </p:cNvSpPr>
-          <p:nvPr/>
-        </p:nvSpPr>
-        <p:spPr>
-          <a:xfrm>
-            <a:off x="402136" y="152429"/>
-            <a:ext cx="5922464" cy="790422"/>
-          </a:xfrm>
-          <a:prstGeom prst="rect">
-            <a:avLst/>
-          </a:prstGeom>
-          <a:ln>
-            <a:noFill/>
-          </a:ln>
-        </p:spPr>
-        <p:txBody>
-          <a:bodyPr vert="horz" lIns="91440" tIns="45720" rIns="91440" bIns="45720" rtlCol="0" anchor="ctr">
-            <a:normAutofit/>
-          </a:bodyPr>
-          <a:lstStyle>
-            <a:lvl1pPr algn="l" defTabSz="914400" rtl="0" eaLnBrk="1" latinLnBrk="0" hangingPunct="1">
-              <a:lnSpc>
-                <a:spcPct val="90000"/>
-              </a:lnSpc>
-              <a:spcBef>
-                <a:spcPct val="0"/>
-              </a:spcBef>
-              <a:buNone/>
-              <a:defRPr sz="4400" kern="1200">
-                <a:solidFill>
-                  <a:schemeClr val="tx1"/>
-                </a:solidFill>
-                <a:latin typeface="+mj-lt"/>
-                <a:ea typeface="+mj-ea"/>
-                <a:cs typeface="+mj-cs"/>
-              </a:defRPr>
-            </a:lvl1pPr>
-          </a:lstStyle>
-          <a:p>
-            <a:pPr>
-              <a:lnSpc>
-                <a:spcPct val="110000"/>
-              </a:lnSpc>
-            </a:pPr>
-            <a:r>
-              <a:rPr lang="en-SG" sz="4200" b="1" dirty="0">
-                <a:solidFill>
-                  <a:srgbClr val="1C5A57"/>
-                </a:solidFill>
-                <a:latin typeface="Franklin Gothic Demi" panose="020B0703020102020204" pitchFamily="34" charset="0"/>
-              </a:rPr>
               <a:t>Profound</a:t>
             </a:r>
             <a:r>
@@ -16581,7 +16814,7 @@
                 <a:latin typeface="MV Boli" panose="02000500030200090000" pitchFamily="2" charset="0"/>
                 <a:cs typeface="MV Boli" panose="02000500030200090000" pitchFamily="2" charset="0"/>
               </a:rPr>
-              <a:t>Mundane</a:t>
+              <a:t>not profound</a:t>
             </a:r>
             <a:r>
               <a:rPr lang="en-SG" sz="4200" b="1" dirty="0">
@@ -16642,6 +16875,430 @@
         </p:nvSpPr>
         <p:spPr>
           <a:xfrm>
+            <a:off x="402135" y="152429"/>
+            <a:ext cx="8656139" cy="790422"/>
+          </a:xfrm>
+          <a:prstGeom prst="rect">
+            <a:avLst/>
+          </a:prstGeom>
+          <a:ln>
+            <a:noFill/>
+          </a:ln>
+        </p:spPr>
+        <p:txBody>
+          <a:bodyPr vert="horz" lIns="91440" tIns="45720" rIns="91440" bIns="45720" rtlCol="0" anchor="ctr">
+            <a:normAutofit/>
+          </a:bodyPr>
+          <a:lstStyle>
+            <a:lvl1pPr algn="l" defTabSz="914400" rtl="0" eaLnBrk="1" latinLnBrk="0" hangingPunct="1">
+              <a:lnSpc>
+                <a:spcPct val="90000"/>
+              </a:lnSpc>
+              <a:spcBef>
+                <a:spcPct val="0"/>
+              </a:spcBef>
+              <a:buNone/>
+              <a:defRPr sz="4400" kern="1200">
+                <a:solidFill>
+                  <a:schemeClr val="tx1"/>
+                </a:solidFill>
+                <a:latin typeface="+mj-lt"/>
+                <a:ea typeface="+mj-ea"/>
+                <a:cs typeface="+mj-cs"/>
+              </a:defRPr>
+            </a:lvl1pPr>
+          </a:lstStyle>
+          <a:p>
+            <a:pPr>
+              <a:lnSpc>
+                <a:spcPct val="110000"/>
+              </a:lnSpc>
+            </a:pPr>
+            <a:r>
+              <a:rPr lang="en-SG" sz="4200" b="1" dirty="0">
+                <a:solidFill>
+                  <a:srgbClr val="1C5A57"/>
+                </a:solidFill>
+                <a:latin typeface="Franklin Gothic Demi" panose="020B0703020102020204" pitchFamily="34" charset="0"/>
+              </a:rPr>
+              <a:t>Limitations and Future Directions</a:t>
+            </a:r>
+            <a:endParaRPr lang="en-SG" sz="4200" b="1" dirty="0">
+              <a:latin typeface="MV Boli" panose="02000500030200090000" pitchFamily="2" charset="0"/>
+              <a:cs typeface="MV Boli" panose="02000500030200090000" pitchFamily="2" charset="0"/>
+            </a:endParaRPr>
+          </a:p>
+        </p:txBody>
+      </p:sp>
+      <p:sp>
+        <p:nvSpPr>
+          <p:cNvPr id="7" name="Content Placeholder 2">
+            <a:extLst>
+              <a:ext uri="{FF2B5EF4-FFF2-40B4-BE49-F238E27FC236}">
+                <a16:creationId xmlns:a16="http://schemas.microsoft.com/office/drawing/2014/main" id="{F8E95695-D1C9-40A8-A177-A3190E00CFD1}"/>
+              </a:ext>
+            </a:extLst>
+          </p:cNvPr>
+          <p:cNvSpPr txBox="1">
+            <a:spLocks/>
+          </p:cNvSpPr>
+          <p:nvPr/>
+        </p:nvSpPr>
+        <p:spPr>
+          <a:xfrm>
+            <a:off x="828675" y="1424382"/>
+            <a:ext cx="10963275" cy="5029387"/>
+          </a:xfrm>
+          <a:prstGeom prst="rect">
+            <a:avLst/>
+          </a:prstGeom>
+        </p:spPr>
+        <p:txBody>
+          <a:bodyPr vert="horz" lIns="91440" tIns="45720" rIns="91440" bIns="45720" rtlCol="0">
+            <a:normAutofit/>
+          </a:bodyPr>
+          <a:lstStyle>
+            <a:lvl1pPr marL="228600" indent="-228600" algn="l" defTabSz="914400" rtl="0" eaLnBrk="1" latinLnBrk="0" hangingPunct="1">
+              <a:lnSpc>
+                <a:spcPct val="90000"/>
+              </a:lnSpc>
+              <a:spcBef>
+                <a:spcPts val="1000"/>
+              </a:spcBef>
+              <a:buFont typeface="Arial" panose="020B0604020202020204" pitchFamily="34" charset="0"/>
+              <a:buChar char="•"/>
+              <a:defRPr sz="2800" kern="1200">
+                <a:solidFill>
+                  <a:schemeClr val="tx1"/>
+                </a:solidFill>
+                <a:latin typeface="+mn-lt"/>
+                <a:ea typeface="+mn-ea"/>
+                <a:cs typeface="+mn-cs"/>
+              </a:defRPr>
+            </a:lvl1pPr>
+            <a:lvl2pPr marL="685800" indent="-228600" algn="l" defTabSz="914400" rtl="0" eaLnBrk="1" latinLnBrk="0" hangingPunct="1">
+              <a:lnSpc>
+                <a:spcPct val="90000"/>
+              </a:lnSpc>
+              <a:spcBef>
+                <a:spcPts val="500"/>
+              </a:spcBef>
+              <a:buFont typeface="Arial" panose="020B0604020202020204" pitchFamily="34" charset="0"/>
+              <a:buChar char="•"/>
+              <a:defRPr sz="2400" kern="1200">
+                <a:solidFill>
+                  <a:schemeClr val="tx1"/>
+                </a:solidFill>
+                <a:latin typeface="+mn-lt"/>
+                <a:ea typeface="+mn-ea"/>
+                <a:cs typeface="+mn-cs"/>
+              </a:defRPr>
+            </a:lvl2pPr>
+            <a:lvl3pPr marL="1143000" indent="-228600" algn="l" defTabSz="914400" rtl="0" eaLnBrk="1" latinLnBrk="0" hangingPunct="1">
+              <a:lnSpc>
+                <a:spcPct val="90000"/>
+              </a:lnSpc>
+              <a:spcBef>
+                <a:spcPts val="500"/>
+              </a:spcBef>
+              <a:buFont typeface="Arial" panose="020B0604020202020204" pitchFamily="34" charset="0"/>
+              <a:buChar char="•"/>
+              <a:defRPr sz="2000" kern="1200">
+                <a:solidFill>
+                  <a:schemeClr val="tx1"/>
+                </a:solidFill>
+                <a:latin typeface="+mn-lt"/>
+                <a:ea typeface="+mn-ea"/>
+                <a:cs typeface="+mn-cs"/>
+              </a:defRPr>
+            </a:lvl3pPr>
+            <a:lvl4pPr marL="1600200" indent="-228600" algn="l" defTabSz="914400" rtl="0" eaLnBrk="1" latinLnBrk="0" hangingPunct="1">
+              <a:lnSpc>
+                <a:spcPct val="90000"/>
+              </a:lnSpc>
+              <a:spcBef>
+                <a:spcPts val="500"/>
+              </a:spcBef>
+              <a:buFont typeface="Arial" panose="020B0604020202020204" pitchFamily="34" charset="0"/>
+              <a:buChar char="•"/>
+              <a:defRPr sz="1800" kern="1200">
+                <a:solidFill>
+                  <a:schemeClr val="tx1"/>
+                </a:solidFill>
+                <a:latin typeface="+mn-lt"/>
+                <a:ea typeface="+mn-ea"/>
+                <a:cs typeface="+mn-cs"/>
+              </a:defRPr>
+            </a:lvl4pPr>
+            <a:lvl5pPr marL="2057400" indent="-228600" algn="l" defTabSz="914400" rtl="0" eaLnBrk="1" latinLnBrk="0" hangingPunct="1">
+              <a:lnSpc>
+                <a:spcPct val="90000"/>
+              </a:lnSpc>
+              <a:spcBef>
+                <a:spcPts val="500"/>
+              </a:spcBef>
+              <a:buFont typeface="Arial" panose="020B0604020202020204" pitchFamily="34" charset="0"/>
+              <a:buChar char="•"/>
+              <a:defRPr sz="1800" kern="1200">
+                <a:solidFill>
+                  <a:schemeClr val="tx1"/>
+                </a:solidFill>
+                <a:latin typeface="+mn-lt"/>
+                <a:ea typeface="+mn-ea"/>
+                <a:cs typeface="+mn-cs"/>
+              </a:defRPr>
+            </a:lvl5pPr>
+            <a:lvl6pPr marL="2514600" indent="-228600" algn="l" defTabSz="914400" rtl="0" eaLnBrk="1" latinLnBrk="0" hangingPunct="1">
+              <a:lnSpc>
+                <a:spcPct val="90000"/>
+              </a:lnSpc>
+              <a:spcBef>
+                <a:spcPts val="500"/>
+              </a:spcBef>
+              <a:buFont typeface="Arial" panose="020B0604020202020204" pitchFamily="34" charset="0"/>
+              <a:buChar char="•"/>
+              <a:defRPr sz="1800" kern="1200">
+                <a:solidFill>
+                  <a:schemeClr val="tx1"/>
+                </a:solidFill>
+                <a:latin typeface="+mn-lt"/>
+                <a:ea typeface="+mn-ea"/>
+                <a:cs typeface="+mn-cs"/>
+              </a:defRPr>
+            </a:lvl6pPr>
+            <a:lvl7pPr marL="2971800" indent="-228600" algn="l" defTabSz="914400" rtl="0" eaLnBrk="1" latinLnBrk="0" hangingPunct="1">
+              <a:lnSpc>
+                <a:spcPct val="90000"/>
+              </a:lnSpc>
+              <a:spcBef>
+                <a:spcPts val="500"/>
+              </a:spcBef>
+              <a:buFont typeface="Arial" panose="020B0604020202020204" pitchFamily="34" charset="0"/>
+              <a:buChar char="•"/>
+              <a:defRPr sz="1800" kern="1200">
+                <a:solidFill>
+                  <a:schemeClr val="tx1"/>
+                </a:solidFill>
+                <a:latin typeface="+mn-lt"/>
+                <a:ea typeface="+mn-ea"/>
+                <a:cs typeface="+mn-cs"/>
+              </a:defRPr>
+            </a:lvl7pPr>
+            <a:lvl8pPr marL="3429000" indent="-228600" algn="l" defTabSz="914400" rtl="0" eaLnBrk="1" latinLnBrk="0" hangingPunct="1">
+              <a:lnSpc>
+                <a:spcPct val="90000"/>
+              </a:lnSpc>
+              <a:spcBef>
+                <a:spcPts val="500"/>
+              </a:spcBef>
+              <a:buFont typeface="Arial" panose="020B0604020202020204" pitchFamily="34" charset="0"/>
+              <a:buChar char="•"/>
+              <a:defRPr sz="1800" kern="1200">
+                <a:solidFill>
+                  <a:schemeClr val="tx1"/>
+                </a:solidFill>
+                <a:latin typeface="+mn-lt"/>
+                <a:ea typeface="+mn-ea"/>
+                <a:cs typeface="+mn-cs"/>
+              </a:defRPr>
+            </a:lvl8pPr>
+            <a:lvl9pPr marL="3886200" indent="-228600" algn="l" defTabSz="914400" rtl="0" eaLnBrk="1" latinLnBrk="0" hangingPunct="1">
+              <a:lnSpc>
+                <a:spcPct val="90000"/>
+              </a:lnSpc>
+              <a:spcBef>
+                <a:spcPts val="500"/>
+              </a:spcBef>
+              <a:buFont typeface="Arial" panose="020B0604020202020204" pitchFamily="34" charset="0"/>
+              <a:buChar char="•"/>
+              <a:defRPr sz="1800" kern="1200">
+                <a:solidFill>
+                  <a:schemeClr val="tx1"/>
+                </a:solidFill>
+                <a:latin typeface="+mn-lt"/>
+                <a:ea typeface="+mn-ea"/>
+                <a:cs typeface="+mn-cs"/>
+              </a:defRPr>
+            </a:lvl9pPr>
+          </a:lstStyle>
+          <a:p>
+            <a:pPr marL="514350" indent="-514350" algn="just">
+              <a:lnSpc>
+                <a:spcPct val="130000"/>
+              </a:lnSpc>
+              <a:buFont typeface="Arial" panose="020B0604020202020204" pitchFamily="34" charset="0"/>
+              <a:buAutoNum type="arabicPeriod"/>
+            </a:pPr>
+            <a:r>
+              <a:rPr lang="en-SG" b="1" i="1" dirty="0">
+                <a:solidFill>
+                  <a:srgbClr val="1C5A57"/>
+                </a:solidFill>
+                <a:latin typeface="Franklin Gothic Demi" panose="020B0703020102020204" pitchFamily="34" charset="0"/>
+              </a:rPr>
+              <a:t>Cleaner data – samples which are correctly labelled</a:t>
+            </a:r>
+          </a:p>
+          <a:p>
+            <a:pPr marL="514350" indent="-514350" algn="just">
+              <a:lnSpc>
+                <a:spcPct val="130000"/>
+              </a:lnSpc>
+              <a:buFont typeface="Arial" panose="020B0604020202020204" pitchFamily="34" charset="0"/>
+              <a:buAutoNum type="arabicPeriod"/>
+            </a:pPr>
+            <a:endParaRPr lang="en-SG" b="1" i="1" dirty="0">
+              <a:solidFill>
+                <a:srgbClr val="1C5A57"/>
+              </a:solidFill>
+              <a:latin typeface="Franklin Gothic Demi" panose="020B0703020102020204" pitchFamily="34" charset="0"/>
+            </a:endParaRPr>
+          </a:p>
+          <a:p>
+            <a:pPr marL="514350" indent="-514350" algn="just">
+              <a:lnSpc>
+                <a:spcPct val="130000"/>
+              </a:lnSpc>
+              <a:buFont typeface="Arial" panose="020B0604020202020204" pitchFamily="34" charset="0"/>
+              <a:buAutoNum type="arabicPeriod"/>
+            </a:pPr>
+            <a:r>
+              <a:rPr lang="en-SG" b="1" i="1" dirty="0">
+                <a:solidFill>
+                  <a:srgbClr val="1C5A57"/>
+                </a:solidFill>
+                <a:latin typeface="Franklin Gothic Demi" panose="020B0703020102020204" pitchFamily="34" charset="0"/>
+              </a:rPr>
+              <a:t>Word corpus – a corpus of profound terms or shallow words/internet slangs as reference for our classifier</a:t>
+            </a:r>
+          </a:p>
+          <a:p>
+            <a:pPr marL="514350" indent="-514350" algn="just">
+              <a:lnSpc>
+                <a:spcPct val="130000"/>
+              </a:lnSpc>
+              <a:buFont typeface="Arial" panose="020B0604020202020204" pitchFamily="34" charset="0"/>
+              <a:buAutoNum type="arabicPeriod"/>
+            </a:pPr>
+            <a:endParaRPr lang="en-SG" b="1" i="1" dirty="0">
+              <a:solidFill>
+                <a:srgbClr val="1C5A57"/>
+              </a:solidFill>
+              <a:latin typeface="Franklin Gothic Demi" panose="020B0703020102020204" pitchFamily="34" charset="0"/>
+            </a:endParaRPr>
+          </a:p>
+          <a:p>
+            <a:pPr marL="514350" indent="-514350" algn="just">
+              <a:lnSpc>
+                <a:spcPct val="130000"/>
+              </a:lnSpc>
+              <a:buFont typeface="Arial" panose="020B0604020202020204" pitchFamily="34" charset="0"/>
+              <a:buAutoNum type="arabicPeriod"/>
+            </a:pPr>
+            <a:r>
+              <a:rPr lang="en-SG" b="1" i="1" dirty="0">
+                <a:solidFill>
+                  <a:srgbClr val="1C5A57"/>
+                </a:solidFill>
+                <a:latin typeface="Franklin Gothic Demi" panose="020B0703020102020204" pitchFamily="34" charset="0"/>
+              </a:rPr>
+              <a:t>Contextual analysis – Methods to understand context and relations</a:t>
+            </a:r>
+          </a:p>
+          <a:p>
+            <a:pPr marL="0" indent="0" algn="just">
+              <a:lnSpc>
+                <a:spcPct val="130000"/>
+              </a:lnSpc>
+              <a:buNone/>
+            </a:pPr>
+            <a:endParaRPr lang="en-SG" b="1" i="1" dirty="0">
+              <a:solidFill>
+                <a:srgbClr val="1C5A57"/>
+              </a:solidFill>
+              <a:latin typeface="Franklin Gothic Demi" panose="020B0703020102020204" pitchFamily="34" charset="0"/>
+            </a:endParaRPr>
+          </a:p>
+          <a:p>
+            <a:pPr marL="514350" indent="-514350" algn="just">
+              <a:lnSpc>
+                <a:spcPct val="130000"/>
+              </a:lnSpc>
+              <a:buFont typeface="Arial" panose="020B0604020202020204" pitchFamily="34" charset="0"/>
+              <a:buAutoNum type="arabicPeriod"/>
+            </a:pPr>
+            <a:endParaRPr lang="en-SG" b="1" i="1" dirty="0">
+              <a:solidFill>
+                <a:srgbClr val="1C5A57"/>
+              </a:solidFill>
+              <a:latin typeface="Franklin Gothic Demi" panose="020B0703020102020204" pitchFamily="34" charset="0"/>
+            </a:endParaRPr>
+          </a:p>
+          <a:p>
+            <a:pPr marL="0" indent="0" algn="just">
+              <a:lnSpc>
+                <a:spcPct val="130000"/>
+              </a:lnSpc>
+              <a:buNone/>
+            </a:pPr>
+            <a:endParaRPr lang="en-SG" b="1" i="1" dirty="0">
+              <a:solidFill>
+                <a:srgbClr val="1C5A57"/>
+              </a:solidFill>
+              <a:latin typeface="Franklin Gothic Demi" panose="020B0703020102020204" pitchFamily="34" charset="0"/>
+            </a:endParaRPr>
+          </a:p>
+        </p:txBody>
+      </p:sp>
+    </p:spTree>
+    <p:extLst>
+      <p:ext uri="{BB962C8B-B14F-4D97-AF65-F5344CB8AC3E}">
+        <p14:creationId xmlns:p14="http://schemas.microsoft.com/office/powerpoint/2010/main" val="1221840576"/>
+      </p:ext>
+    </p:extLst>
+  </p:cSld>
+  <p:clrMapOvr>
+    <a:masterClrMapping/>
+  </p:clrMapOvr>
+  <p:transition spd="slow">
+    <p:push dir="u"/>
+  </p:transition>
+</p:sld>
+</file>
+
+<file path=ppt/slides/slide31.xml><?xml version="1.0" encoding="utf-8"?>
+<p:sld xmlns:a="http://schemas.openxmlformats.org/drawingml/2006/main" xmlns:r="http://schemas.openxmlformats.org/officeDocument/2006/relationships" xmlns:p="http://schemas.openxmlformats.org/presentationml/2006/main">
+  <p:cSld>
+    <p:spTree>
+      <p:nvGrpSpPr>
+        <p:cNvPr id="1" name=""/>
+        <p:cNvGrpSpPr/>
+        <p:nvPr/>
+      </p:nvGrpSpPr>
+      <p:grpSpPr>
+        <a:xfrm>
+          <a:off x="0" y="0"/>
+          <a:ext cx="0" cy="0"/>
+          <a:chOff x="0" y="0"/>
+          <a:chExt cx="0" cy="0"/>
+        </a:xfrm>
+      </p:grpSpPr>
+      <p:sp>
+        <p:nvSpPr>
+          <p:cNvPr id="6" name="Title 1">
+            <a:extLst>
+              <a:ext uri="{FF2B5EF4-FFF2-40B4-BE49-F238E27FC236}">
+                <a16:creationId xmlns:a16="http://schemas.microsoft.com/office/drawing/2014/main" id="{B0087C6E-B92B-4A0C-83AC-05B919D152B3}"/>
+              </a:ext>
+            </a:extLst>
+          </p:cNvPr>
+          <p:cNvSpPr txBox="1">
+            <a:spLocks/>
+          </p:cNvSpPr>
+          <p:nvPr/>
+        </p:nvSpPr>
+        <p:spPr>
+          <a:xfrm>
             <a:off x="5414417" y="2235200"/>
             <a:ext cx="1862683" cy="2073151"/>
           </a:xfrm>
@@ -16714,7 +17371,7 @@
 </file>
 
 <file path=ppt/slides/slide4.xml><?xml version="1.0" encoding="utf-8"?>
-<p:sld xmlns:a="http://schemas.openxmlformats.org/drawingml/2006/main" xmlns:r="http://schemas.openxmlformats.org/officeDocument/2006/relationships" xmlns:p="http://schemas.openxmlformats.org/presentationml/2006/main">
+<p:sld xmlns:a="http://schemas.openxmlformats.org/drawingml/2006/main" xmlns:r="http://schemas.openxmlformats.org/officeDocument/2006/relationships" xmlns:p="http://schemas.openxmlformats.org/presentationml/2006/main" show="0">
   <p:cSld>
     <p:spTree>
       <p:nvGrpSpPr>
@@ -16836,10 +17493,10 @@
       </p:sp>
       <p:sp>
         <p:nvSpPr>
-          <p:cNvPr id="5" name="Title 1">
+          <p:cNvPr id="6" name="Title 1">
             <a:extLst>
               <a:ext uri="{FF2B5EF4-FFF2-40B4-BE49-F238E27FC236}">
-                <a16:creationId xmlns:a16="http://schemas.microsoft.com/office/drawing/2014/main" id="{F6EED54A-D76A-4380-B007-2E4AF760F62E}"/>
+                <a16:creationId xmlns:a16="http://schemas.microsoft.com/office/drawing/2014/main" id="{1A24467E-AB98-4156-84D6-1241B5ECA690}"/>
               </a:ext>
             </a:extLst>
           </p:cNvPr>
@@ -16850,8 +17507,8 @@
         </p:nvSpPr>
         <p:spPr>
           <a:xfrm>
-            <a:off x="402136" y="152429"/>
-            <a:ext cx="5922464" cy="790422"/>
+            <a:off x="402135" y="152429"/>
+            <a:ext cx="7466979" cy="790422"/>
           </a:xfrm>
           <a:prstGeom prst="rect">
             <a:avLst/>
@@ -16924,7 +17581,7 @@
                 <a:latin typeface="MV Boli" panose="02000500030200090000" pitchFamily="2" charset="0"/>
                 <a:cs typeface="MV Boli" panose="02000500030200090000" pitchFamily="2" charset="0"/>
               </a:rPr>
-              <a:t>Mundane</a:t>
+              <a:t>not profound</a:t>
             </a:r>
             <a:r>
               <a:rPr lang="en-SG" sz="4200" b="1" dirty="0">
@@ -16953,7 +17610,7 @@
 </file>
 
 <file path=ppt/slides/slide5.xml><?xml version="1.0" encoding="utf-8"?>
-<p:sld xmlns:a="http://schemas.openxmlformats.org/drawingml/2006/main" xmlns:r="http://schemas.openxmlformats.org/officeDocument/2006/relationships" xmlns:p="http://schemas.openxmlformats.org/presentationml/2006/main">
+<p:sld xmlns:a="http://schemas.openxmlformats.org/drawingml/2006/main" xmlns:r="http://schemas.openxmlformats.org/officeDocument/2006/relationships" xmlns:p="http://schemas.openxmlformats.org/presentationml/2006/main" show="0">
   <p:cSld>
     <p:spTree>
       <p:nvGrpSpPr>
@@ -17090,10 +17747,10 @@
       </p:sp>
       <p:sp>
         <p:nvSpPr>
-          <p:cNvPr id="6" name="Title 1">
+          <p:cNvPr id="5" name="Title 1">
             <a:extLst>
               <a:ext uri="{FF2B5EF4-FFF2-40B4-BE49-F238E27FC236}">
-                <a16:creationId xmlns:a16="http://schemas.microsoft.com/office/drawing/2014/main" id="{FB761884-C8B8-4F6D-A588-06E8C1B4B782}"/>
+                <a16:creationId xmlns:a16="http://schemas.microsoft.com/office/drawing/2014/main" id="{06EE4268-BBD5-40DC-91A3-1E29BFFE20FB}"/>
               </a:ext>
             </a:extLst>
           </p:cNvPr>
@@ -17104,8 +17761,8 @@
         </p:nvSpPr>
         <p:spPr>
           <a:xfrm>
-            <a:off x="402136" y="152429"/>
-            <a:ext cx="5922464" cy="790422"/>
+            <a:off x="402135" y="152429"/>
+            <a:ext cx="7466979" cy="790422"/>
           </a:xfrm>
           <a:prstGeom prst="rect">
             <a:avLst/>
@@ -17178,7 +17835,7 @@
                 <a:latin typeface="MV Boli" panose="02000500030200090000" pitchFamily="2" charset="0"/>
                 <a:cs typeface="MV Boli" panose="02000500030200090000" pitchFamily="2" charset="0"/>
               </a:rPr>
-              <a:t>Mundane</a:t>
+              <a:t>not profound</a:t>
             </a:r>
             <a:r>
               <a:rPr lang="en-SG" sz="4200" b="1" dirty="0">
@@ -17574,7 +18231,7 @@
         <p:spPr>
           <a:xfrm>
             <a:off x="4456090" y="1233882"/>
-            <a:ext cx="7335860" cy="5029387"/>
+            <a:ext cx="7533852" cy="5029387"/>
           </a:xfrm>
           <a:prstGeom prst="rect">
             <a:avLst/>
@@ -17582,7 +18239,7 @@
         </p:spPr>
         <p:txBody>
           <a:bodyPr vert="horz" lIns="91440" tIns="45720" rIns="91440" bIns="45720" rtlCol="0">
-            <a:normAutofit fontScale="92500" lnSpcReduction="20000"/>
+            <a:normAutofit fontScale="92500" lnSpcReduction="10000"/>
           </a:bodyPr>
           <a:lstStyle>
             <a:lvl1pPr marL="228600" indent="-228600" algn="l" defTabSz="914400" rtl="0" eaLnBrk="1" latinLnBrk="0" hangingPunct="1">
@@ -17781,7 +18438,7 @@
                 </a:solidFill>
                 <a:latin typeface="Franklin Gothic Demi" panose="020B0703020102020204" pitchFamily="34" charset="0"/>
               </a:rPr>
-              <a:t>2. Can we develop a reliable subreddit classifier to classify statements from r/</a:t>
+              <a:t>2. Can we develop a reliable subreddit classifier to classify statements from r/quotes vs r/ </a:t>
             </a:r>
             <a:r>
               <a:rPr lang="en-SG" b="1" i="1" dirty="0" err="1">
@@ -17799,7 +18456,7 @@
                 </a:solidFill>
                 <a:latin typeface="Franklin Gothic Demi" panose="020B0703020102020204" pitchFamily="34" charset="0"/>
               </a:rPr>
-              <a:t> vs r/quotes?</a:t>
+              <a:t>?</a:t>
             </a:r>
           </a:p>
           <a:p>
@@ -18899,8 +19556,8 @@
         </p:nvSpPr>
         <p:spPr>
           <a:xfrm>
-            <a:off x="6324600" y="1066906"/>
-            <a:ext cx="3498306" cy="790422"/>
+            <a:off x="6324599" y="1066906"/>
+            <a:ext cx="4350249" cy="790422"/>
           </a:xfrm>
           <a:prstGeom prst="rect">
             <a:avLst/>
@@ -18946,7 +19603,7 @@
                 <a:latin typeface="MV Boli" panose="02000500030200090000" pitchFamily="2" charset="0"/>
                 <a:cs typeface="MV Boli" panose="02000500030200090000" pitchFamily="2" charset="0"/>
               </a:rPr>
-              <a:t>Mundane</a:t>
+              <a:t>Not profound</a:t>
             </a:r>
             <a:endParaRPr lang="en-SG" sz="4200" b="1" dirty="0">
               <a:latin typeface="MV Boli" panose="02000500030200090000" pitchFamily="2" charset="0"/>
@@ -19875,6 +20532,27 @@
                 <a:cs typeface="MV Boli" panose="02000500030200090000" pitchFamily="2" charset="0"/>
               </a:rPr>
               <a:t>Date posted</a:t>
+            </a:r>
+          </a:p>
+          <a:p>
+            <a:pPr marL="457200" indent="-457200">
+              <a:lnSpc>
+                <a:spcPct val="150000"/>
+              </a:lnSpc>
+              <a:buFont typeface="Arial" panose="020B0604020202020204" pitchFamily="34" charset="0"/>
+              <a:buChar char="•"/>
+            </a:pPr>
+            <a:r>
+              <a:rPr lang="en-US" sz="2800" dirty="0">
+                <a:solidFill>
+                  <a:schemeClr val="bg1">
+                    <a:lumMod val="65000"/>
+                  </a:schemeClr>
+                </a:solidFill>
+                <a:latin typeface="Franklin Gothic Demi" panose="020B0703020102020204" pitchFamily="34" charset="0"/>
+                <a:cs typeface="MV Boli" panose="02000500030200090000" pitchFamily="2" charset="0"/>
+              </a:rPr>
+              <a:t>Self text</a:t>
             </a:r>
           </a:p>
           <a:p>

</xml_diff>

<commit_message>
update readme with app
</commit_message>
<xml_diff>
--- a/presentation/subreddit_classifier.pptx
+++ b/presentation/subreddit_classifier.pptx
@@ -227,7 +227,7 @@
           <a:p>
             <a:fld id="{5D025E36-0042-4A3E-8A11-8EC6AED19BB1}" type="datetimeFigureOut">
               <a:rPr lang="en-SG" smtClean="0"/>
-              <a:t>10/3/2022</a:t>
+              <a:t>13/3/2022</a:t>
             </a:fld>
             <a:endParaRPr lang="en-SG"/>
           </a:p>
@@ -2038,7 +2038,7 @@
           <a:p>
             <a:fld id="{801E2BF2-5CCC-4DD0-A0A4-F925FD3FFCC2}" type="datetimeFigureOut">
               <a:rPr lang="en-SG" smtClean="0"/>
-              <a:t>10/3/2022</a:t>
+              <a:t>13/3/2022</a:t>
             </a:fld>
             <a:endParaRPr lang="en-SG"/>
           </a:p>
@@ -2238,7 +2238,7 @@
           <a:p>
             <a:fld id="{801E2BF2-5CCC-4DD0-A0A4-F925FD3FFCC2}" type="datetimeFigureOut">
               <a:rPr lang="en-SG" smtClean="0"/>
-              <a:t>10/3/2022</a:t>
+              <a:t>13/3/2022</a:t>
             </a:fld>
             <a:endParaRPr lang="en-SG"/>
           </a:p>
@@ -2448,7 +2448,7 @@
           <a:p>
             <a:fld id="{801E2BF2-5CCC-4DD0-A0A4-F925FD3FFCC2}" type="datetimeFigureOut">
               <a:rPr lang="en-SG" smtClean="0"/>
-              <a:t>10/3/2022</a:t>
+              <a:t>13/3/2022</a:t>
             </a:fld>
             <a:endParaRPr lang="en-SG"/>
           </a:p>
@@ -2648,7 +2648,7 @@
           <a:p>
             <a:fld id="{801E2BF2-5CCC-4DD0-A0A4-F925FD3FFCC2}" type="datetimeFigureOut">
               <a:rPr lang="en-SG" smtClean="0"/>
-              <a:t>10/3/2022</a:t>
+              <a:t>13/3/2022</a:t>
             </a:fld>
             <a:endParaRPr lang="en-SG"/>
           </a:p>
@@ -2924,7 +2924,7 @@
           <a:p>
             <a:fld id="{801E2BF2-5CCC-4DD0-A0A4-F925FD3FFCC2}" type="datetimeFigureOut">
               <a:rPr lang="en-SG" smtClean="0"/>
-              <a:t>10/3/2022</a:t>
+              <a:t>13/3/2022</a:t>
             </a:fld>
             <a:endParaRPr lang="en-SG"/>
           </a:p>
@@ -3192,7 +3192,7 @@
           <a:p>
             <a:fld id="{801E2BF2-5CCC-4DD0-A0A4-F925FD3FFCC2}" type="datetimeFigureOut">
               <a:rPr lang="en-SG" smtClean="0"/>
-              <a:t>10/3/2022</a:t>
+              <a:t>13/3/2022</a:t>
             </a:fld>
             <a:endParaRPr lang="en-SG"/>
           </a:p>
@@ -3607,7 +3607,7 @@
           <a:p>
             <a:fld id="{801E2BF2-5CCC-4DD0-A0A4-F925FD3FFCC2}" type="datetimeFigureOut">
               <a:rPr lang="en-SG" smtClean="0"/>
-              <a:t>10/3/2022</a:t>
+              <a:t>13/3/2022</a:t>
             </a:fld>
             <a:endParaRPr lang="en-SG"/>
           </a:p>
@@ -3749,7 +3749,7 @@
           <a:p>
             <a:fld id="{801E2BF2-5CCC-4DD0-A0A4-F925FD3FFCC2}" type="datetimeFigureOut">
               <a:rPr lang="en-SG" smtClean="0"/>
-              <a:t>10/3/2022</a:t>
+              <a:t>13/3/2022</a:t>
             </a:fld>
             <a:endParaRPr lang="en-SG"/>
           </a:p>
@@ -3862,7 +3862,7 @@
           <a:p>
             <a:fld id="{801E2BF2-5CCC-4DD0-A0A4-F925FD3FFCC2}" type="datetimeFigureOut">
               <a:rPr lang="en-SG" smtClean="0"/>
-              <a:t>10/3/2022</a:t>
+              <a:t>13/3/2022</a:t>
             </a:fld>
             <a:endParaRPr lang="en-SG"/>
           </a:p>
@@ -4175,7 +4175,7 @@
           <a:p>
             <a:fld id="{801E2BF2-5CCC-4DD0-A0A4-F925FD3FFCC2}" type="datetimeFigureOut">
               <a:rPr lang="en-SG" smtClean="0"/>
-              <a:t>10/3/2022</a:t>
+              <a:t>13/3/2022</a:t>
             </a:fld>
             <a:endParaRPr lang="en-SG"/>
           </a:p>
@@ -4464,7 +4464,7 @@
           <a:p>
             <a:fld id="{801E2BF2-5CCC-4DD0-A0A4-F925FD3FFCC2}" type="datetimeFigureOut">
               <a:rPr lang="en-SG" smtClean="0"/>
-              <a:t>10/3/2022</a:t>
+              <a:t>13/3/2022</a:t>
             </a:fld>
             <a:endParaRPr lang="en-SG"/>
           </a:p>
@@ -4707,7 +4707,7 @@
           <a:p>
             <a:fld id="{801E2BF2-5CCC-4DD0-A0A4-F925FD3FFCC2}" type="datetimeFigureOut">
               <a:rPr lang="en-SG" smtClean="0"/>
-              <a:t>10/3/2022</a:t>
+              <a:t>13/3/2022</a:t>
             </a:fld>
             <a:endParaRPr lang="en-SG"/>
           </a:p>

</xml_diff>